<commit_message>
split the semaine2-1* to move all the float discussion and math module to semaine2-2
initial commit for semaine2-2*
</commit_message>
<xml_diff>
--- a/semaine2/semaine2-1.pptx
+++ b/semaine2/semaine2-1.pptx
@@ -5,18 +5,15 @@
     <p:sldMasterId id="2147483649" r:id="rId1"/>
   </p:sldMasterIdLst>
   <p:notesMasterIdLst>
-    <p:notesMasterId r:id="rId8"/>
+    <p:notesMasterId r:id="rId5"/>
   </p:notesMasterIdLst>
   <p:handoutMasterIdLst>
-    <p:handoutMasterId r:id="rId9"/>
+    <p:handoutMasterId r:id="rId6"/>
   </p:handoutMasterIdLst>
   <p:sldIdLst>
     <p:sldId id="893" r:id="rId2"/>
-    <p:sldId id="891" r:id="rId3"/>
-    <p:sldId id="894" r:id="rId4"/>
-    <p:sldId id="632" r:id="rId5"/>
-    <p:sldId id="634" r:id="rId6"/>
-    <p:sldId id="635" r:id="rId7"/>
+    <p:sldId id="895" r:id="rId3"/>
+    <p:sldId id="891" r:id="rId4"/>
   </p:sldIdLst>
   <p:sldSz cx="9144000" cy="6858000" type="screen4x3"/>
   <p:notesSz cx="7099300" cy="10234613"/>
@@ -151,11 +148,8 @@
         <p14:section name="Section par défaut" id="{28C650F0-13B2-49C9-9ED4-D40CD07835D6}">
           <p14:sldIdLst>
             <p14:sldId id="893"/>
+            <p14:sldId id="895"/>
             <p14:sldId id="891"/>
-            <p14:sldId id="894"/>
-            <p14:sldId id="632"/>
-            <p14:sldId id="634"/>
-            <p14:sldId id="635"/>
           </p14:sldIdLst>
         </p14:section>
       </p14:sectionLst>
@@ -1045,43 +1039,6 @@
           <a:bodyPr/>
           <a:lstStyle/>
           <a:p>
-            <a:r>
-              <a:rPr lang="fr-FR" dirty="0" smtClean="0"/>
-              <a:t>Immutable est un néologisme</a:t>
-            </a:r>
-            <a:r>
-              <a:rPr lang="fr-FR" baseline="0" dirty="0" smtClean="0"/>
-              <a:t> (immuable en français), mais il permet </a:t>
-            </a:r>
-          </a:p>
-          <a:p>
-            <a:r>
-              <a:rPr lang="fr-FR" baseline="0" dirty="0" smtClean="0"/>
-              <a:t>Un meilleur parallèle avec la doc anglaise. </a:t>
-            </a:r>
-          </a:p>
-          <a:p>
-            <a:endParaRPr lang="fr-FR" baseline="0" dirty="0" smtClean="0"/>
-          </a:p>
-          <a:p>
-            <a:r>
-              <a:rPr lang="fr-FR" baseline="0" dirty="0" smtClean="0"/>
-              <a:t>Documentation sur tous les </a:t>
-            </a:r>
-            <a:r>
-              <a:rPr lang="fr-FR" baseline="0" dirty="0" err="1" smtClean="0"/>
-              <a:t>built</a:t>
-            </a:r>
-            <a:r>
-              <a:rPr lang="fr-FR" baseline="0" dirty="0" smtClean="0"/>
-              <a:t>-in types dans </a:t>
-            </a:r>
-          </a:p>
-          <a:p>
-            <a:r>
-              <a:rPr lang="fr-FR" dirty="0" smtClean="0"/>
-              <a:t>https://docs.python.org/2/library/stdtypes.html</a:t>
-            </a:r>
             <a:endParaRPr lang="fr-FR" dirty="0"/>
           </a:p>
         </p:txBody>
@@ -1118,7 +1075,7 @@
     </p:spTree>
     <p:extLst>
       <p:ext uri="{BB962C8B-B14F-4D97-AF65-F5344CB8AC3E}">
-        <p14:creationId xmlns:p14="http://schemas.microsoft.com/office/powerpoint/2010/main" val="733846977"/>
+        <p14:creationId xmlns:p14="http://schemas.microsoft.com/office/powerpoint/2010/main" val="929701624"/>
       </p:ext>
     </p:extLst>
   </p:cSld>
@@ -1172,7 +1129,44 @@
           <a:bodyPr/>
           <a:lstStyle/>
           <a:p>
-            <a:endParaRPr lang="fr-FR"/>
+            <a:r>
+              <a:rPr lang="fr-FR" dirty="0" smtClean="0"/>
+              <a:t>Immutable est un néologisme</a:t>
+            </a:r>
+            <a:r>
+              <a:rPr lang="fr-FR" baseline="0" dirty="0" smtClean="0"/>
+              <a:t> (immuable en français), mais il permet </a:t>
+            </a:r>
+          </a:p>
+          <a:p>
+            <a:r>
+              <a:rPr lang="fr-FR" baseline="0" dirty="0" smtClean="0"/>
+              <a:t>Un meilleur parallèle avec la doc anglaise. </a:t>
+            </a:r>
+          </a:p>
+          <a:p>
+            <a:endParaRPr lang="fr-FR" baseline="0" dirty="0" smtClean="0"/>
+          </a:p>
+          <a:p>
+            <a:r>
+              <a:rPr lang="fr-FR" baseline="0" dirty="0" smtClean="0"/>
+              <a:t>Documentation sur tous les </a:t>
+            </a:r>
+            <a:r>
+              <a:rPr lang="fr-FR" baseline="0" dirty="0" err="1" smtClean="0"/>
+              <a:t>built</a:t>
+            </a:r>
+            <a:r>
+              <a:rPr lang="fr-FR" baseline="0" dirty="0" smtClean="0"/>
+              <a:t>-in types dans </a:t>
+            </a:r>
+          </a:p>
+          <a:p>
+            <a:r>
+              <a:rPr lang="fr-FR" dirty="0" smtClean="0"/>
+              <a:t>https://docs.python.org/2/library/stdtypes.html</a:t>
+            </a:r>
+            <a:endParaRPr lang="fr-FR" dirty="0"/>
           </a:p>
         </p:txBody>
       </p:sp>
@@ -1208,277 +1202,7 @@
     </p:spTree>
     <p:extLst>
       <p:ext uri="{BB962C8B-B14F-4D97-AF65-F5344CB8AC3E}">
-        <p14:creationId xmlns:p14="http://schemas.microsoft.com/office/powerpoint/2010/main" val="2913934519"/>
-      </p:ext>
-    </p:extLst>
-  </p:cSld>
-  <p:clrMapOvr>
-    <a:masterClrMapping/>
-  </p:clrMapOvr>
-</p:notes>
-</file>
-
-<file path=ppt/notesSlides/notesSlide4.xml><?xml version="1.0" encoding="utf-8"?>
-<p:notes xmlns:a="http://schemas.openxmlformats.org/drawingml/2006/main" xmlns:r="http://schemas.openxmlformats.org/officeDocument/2006/relationships" xmlns:p="http://schemas.openxmlformats.org/presentationml/2006/main">
-  <p:cSld>
-    <p:spTree>
-      <p:nvGrpSpPr>
-        <p:cNvPr id="1" name=""/>
-        <p:cNvGrpSpPr/>
-        <p:nvPr/>
-      </p:nvGrpSpPr>
-      <p:grpSpPr>
-        <a:xfrm>
-          <a:off x="0" y="0"/>
-          <a:ext cx="0" cy="0"/>
-          <a:chOff x="0" y="0"/>
-          <a:chExt cx="0" cy="0"/>
-        </a:xfrm>
-      </p:grpSpPr>
-      <p:sp>
-        <p:nvSpPr>
-          <p:cNvPr id="2" name="Espace réservé de l'image des diapositives 1"/>
-          <p:cNvSpPr>
-            <a:spLocks noGrp="1" noRot="1" noChangeAspect="1"/>
-          </p:cNvSpPr>
-          <p:nvPr>
-            <p:ph type="sldImg"/>
-          </p:nvPr>
-        </p:nvSpPr>
-        <p:spPr/>
-      </p:sp>
-      <p:sp>
-        <p:nvSpPr>
-          <p:cNvPr id="3" name="Espace réservé des commentaires 2"/>
-          <p:cNvSpPr>
-            <a:spLocks noGrp="1"/>
-          </p:cNvSpPr>
-          <p:nvPr>
-            <p:ph type="body" idx="1"/>
-          </p:nvPr>
-        </p:nvSpPr>
-        <p:spPr/>
-        <p:txBody>
-          <a:bodyPr/>
-          <a:lstStyle/>
-          <a:p>
-            <a:endParaRPr lang="fr-FR" dirty="0"/>
-          </a:p>
-        </p:txBody>
-      </p:sp>
-      <p:sp>
-        <p:nvSpPr>
-          <p:cNvPr id="4" name="Espace réservé du numéro de diapositive 3"/>
-          <p:cNvSpPr>
-            <a:spLocks noGrp="1"/>
-          </p:cNvSpPr>
-          <p:nvPr>
-            <p:ph type="sldNum" sz="quarter" idx="10"/>
-          </p:nvPr>
-        </p:nvSpPr>
-        <p:spPr/>
-        <p:txBody>
-          <a:bodyPr/>
-          <a:lstStyle/>
-          <a:p>
-            <a:pPr>
-              <a:defRPr/>
-            </a:pPr>
-            <a:fld id="{9E8EB9F5-F2F7-4A48-A943-9B409357C15C}" type="slidenum">
-              <a:rPr lang="en-US" smtClean="0"/>
-              <a:pPr>
-                <a:defRPr/>
-              </a:pPr>
-              <a:t>4</a:t>
-            </a:fld>
-            <a:endParaRPr lang="en-US"/>
-          </a:p>
-        </p:txBody>
-      </p:sp>
-    </p:spTree>
-    <p:extLst>
-      <p:ext uri="{BB962C8B-B14F-4D97-AF65-F5344CB8AC3E}">
-        <p14:creationId xmlns:p14="http://schemas.microsoft.com/office/powerpoint/2010/main" val="690933463"/>
-      </p:ext>
-    </p:extLst>
-  </p:cSld>
-  <p:clrMapOvr>
-    <a:masterClrMapping/>
-  </p:clrMapOvr>
-</p:notes>
-</file>
-
-<file path=ppt/notesSlides/notesSlide5.xml><?xml version="1.0" encoding="utf-8"?>
-<p:notes xmlns:a="http://schemas.openxmlformats.org/drawingml/2006/main" xmlns:r="http://schemas.openxmlformats.org/officeDocument/2006/relationships" xmlns:p="http://schemas.openxmlformats.org/presentationml/2006/main">
-  <p:cSld>
-    <p:spTree>
-      <p:nvGrpSpPr>
-        <p:cNvPr id="1" name=""/>
-        <p:cNvGrpSpPr/>
-        <p:nvPr/>
-      </p:nvGrpSpPr>
-      <p:grpSpPr>
-        <a:xfrm>
-          <a:off x="0" y="0"/>
-          <a:ext cx="0" cy="0"/>
-          <a:chOff x="0" y="0"/>
-          <a:chExt cx="0" cy="0"/>
-        </a:xfrm>
-      </p:grpSpPr>
-      <p:sp>
-        <p:nvSpPr>
-          <p:cNvPr id="2" name="Espace réservé de l'image des diapositives 1"/>
-          <p:cNvSpPr>
-            <a:spLocks noGrp="1" noRot="1" noChangeAspect="1"/>
-          </p:cNvSpPr>
-          <p:nvPr>
-            <p:ph type="sldImg"/>
-          </p:nvPr>
-        </p:nvSpPr>
-        <p:spPr/>
-      </p:sp>
-      <p:sp>
-        <p:nvSpPr>
-          <p:cNvPr id="3" name="Espace réservé des commentaires 2"/>
-          <p:cNvSpPr>
-            <a:spLocks noGrp="1"/>
-          </p:cNvSpPr>
-          <p:nvPr>
-            <p:ph type="body" idx="1"/>
-          </p:nvPr>
-        </p:nvSpPr>
-        <p:spPr/>
-        <p:txBody>
-          <a:bodyPr/>
-          <a:lstStyle/>
-          <a:p>
-            <a:endParaRPr lang="fr-FR" dirty="0"/>
-          </a:p>
-        </p:txBody>
-      </p:sp>
-      <p:sp>
-        <p:nvSpPr>
-          <p:cNvPr id="4" name="Espace réservé du numéro de diapositive 3"/>
-          <p:cNvSpPr>
-            <a:spLocks noGrp="1"/>
-          </p:cNvSpPr>
-          <p:nvPr>
-            <p:ph type="sldNum" sz="quarter" idx="10"/>
-          </p:nvPr>
-        </p:nvSpPr>
-        <p:spPr/>
-        <p:txBody>
-          <a:bodyPr/>
-          <a:lstStyle/>
-          <a:p>
-            <a:pPr>
-              <a:defRPr/>
-            </a:pPr>
-            <a:fld id="{9E8EB9F5-F2F7-4A48-A943-9B409357C15C}" type="slidenum">
-              <a:rPr lang="en-US" smtClean="0"/>
-              <a:pPr>
-                <a:defRPr/>
-              </a:pPr>
-              <a:t>5</a:t>
-            </a:fld>
-            <a:endParaRPr lang="en-US"/>
-          </a:p>
-        </p:txBody>
-      </p:sp>
-    </p:spTree>
-    <p:extLst>
-      <p:ext uri="{BB962C8B-B14F-4D97-AF65-F5344CB8AC3E}">
-        <p14:creationId xmlns:p14="http://schemas.microsoft.com/office/powerpoint/2010/main" val="690933463"/>
-      </p:ext>
-    </p:extLst>
-  </p:cSld>
-  <p:clrMapOvr>
-    <a:masterClrMapping/>
-  </p:clrMapOvr>
-</p:notes>
-</file>
-
-<file path=ppt/notesSlides/notesSlide6.xml><?xml version="1.0" encoding="utf-8"?>
-<p:notes xmlns:a="http://schemas.openxmlformats.org/drawingml/2006/main" xmlns:r="http://schemas.openxmlformats.org/officeDocument/2006/relationships" xmlns:p="http://schemas.openxmlformats.org/presentationml/2006/main">
-  <p:cSld>
-    <p:spTree>
-      <p:nvGrpSpPr>
-        <p:cNvPr id="1" name=""/>
-        <p:cNvGrpSpPr/>
-        <p:nvPr/>
-      </p:nvGrpSpPr>
-      <p:grpSpPr>
-        <a:xfrm>
-          <a:off x="0" y="0"/>
-          <a:ext cx="0" cy="0"/>
-          <a:chOff x="0" y="0"/>
-          <a:chExt cx="0" cy="0"/>
-        </a:xfrm>
-      </p:grpSpPr>
-      <p:sp>
-        <p:nvSpPr>
-          <p:cNvPr id="2" name="Espace réservé de l'image des diapositives 1"/>
-          <p:cNvSpPr>
-            <a:spLocks noGrp="1" noRot="1" noChangeAspect="1"/>
-          </p:cNvSpPr>
-          <p:nvPr>
-            <p:ph type="sldImg"/>
-          </p:nvPr>
-        </p:nvSpPr>
-        <p:spPr/>
-      </p:sp>
-      <p:sp>
-        <p:nvSpPr>
-          <p:cNvPr id="3" name="Espace réservé des commentaires 2"/>
-          <p:cNvSpPr>
-            <a:spLocks noGrp="1"/>
-          </p:cNvSpPr>
-          <p:nvPr>
-            <p:ph type="body" idx="1"/>
-          </p:nvPr>
-        </p:nvSpPr>
-        <p:spPr/>
-        <p:txBody>
-          <a:bodyPr/>
-          <a:lstStyle/>
-          <a:p>
-            <a:endParaRPr lang="fr-FR" dirty="0"/>
-          </a:p>
-        </p:txBody>
-      </p:sp>
-      <p:sp>
-        <p:nvSpPr>
-          <p:cNvPr id="4" name="Espace réservé du numéro de diapositive 3"/>
-          <p:cNvSpPr>
-            <a:spLocks noGrp="1"/>
-          </p:cNvSpPr>
-          <p:nvPr>
-            <p:ph type="sldNum" sz="quarter" idx="10"/>
-          </p:nvPr>
-        </p:nvSpPr>
-        <p:spPr/>
-        <p:txBody>
-          <a:bodyPr/>
-          <a:lstStyle/>
-          <a:p>
-            <a:pPr>
-              <a:defRPr/>
-            </a:pPr>
-            <a:fld id="{9E8EB9F5-F2F7-4A48-A943-9B409357C15C}" type="slidenum">
-              <a:rPr lang="en-US" smtClean="0"/>
-              <a:pPr>
-                <a:defRPr/>
-              </a:pPr>
-              <a:t>6</a:t>
-            </a:fld>
-            <a:endParaRPr lang="en-US"/>
-          </a:p>
-        </p:txBody>
-      </p:sp>
-    </p:spTree>
-    <p:extLst>
-      <p:ext uri="{BB962C8B-B14F-4D97-AF65-F5344CB8AC3E}">
-        <p14:creationId xmlns:p14="http://schemas.microsoft.com/office/powerpoint/2010/main" val="690933463"/>
+        <p14:creationId xmlns:p14="http://schemas.microsoft.com/office/powerpoint/2010/main" val="733846977"/>
       </p:ext>
     </p:extLst>
   </p:cSld>
@@ -4971,7 +4695,7 @@
           <a:p>
             <a:r>
               <a:rPr lang="fr-FR" dirty="0" smtClean="0"/>
-              <a:t>Types de base</a:t>
+              <a:t>Résumé de la séquence</a:t>
             </a:r>
             <a:endParaRPr lang="fr-FR" dirty="0"/>
           </a:p>
@@ -4986,114 +4710,64 @@
           <p:nvPr>
             <p:ph idx="1"/>
           </p:nvPr>
+        </p:nvSpPr>
+        <p:spPr/>
+        <p:txBody>
+          <a:bodyPr/>
+          <a:lstStyle/>
+          <a:p>
+            <a:r>
+              <a:rPr lang="fr-FR" dirty="0" smtClean="0"/>
+              <a:t>À la fin de cette vidéo vous connaitrez tous les types numériques en python et saurez les manipuler</a:t>
+            </a:r>
+          </a:p>
+          <a:p>
+            <a:pPr lvl="1"/>
+            <a:endParaRPr lang="fr-FR" dirty="0"/>
+          </a:p>
+        </p:txBody>
+      </p:sp>
+      <p:sp>
+        <p:nvSpPr>
+          <p:cNvPr id="4" name="ZoneTexte 3"/>
+          <p:cNvSpPr txBox="1"/>
+          <p:nvPr/>
         </p:nvSpPr>
         <p:spPr>
           <a:xfrm>
-            <a:off x="457200" y="1417638"/>
-            <a:ext cx="8229600" cy="4708525"/>
+            <a:off x="0" y="92076"/>
+            <a:ext cx="1537855" cy="400110"/>
           </a:xfrm>
+          <a:prstGeom prst="rect">
+            <a:avLst/>
+          </a:prstGeom>
+          <a:noFill/>
+          <a:ln>
+            <a:solidFill>
+              <a:srgbClr val="FF0000"/>
+            </a:solidFill>
+          </a:ln>
         </p:spPr>
         <p:txBody>
-          <a:bodyPr/>
+          <a:bodyPr wrap="square" rtlCol="0">
+            <a:spAutoFit/>
+          </a:bodyPr>
           <a:lstStyle/>
           <a:p>
             <a:r>
-              <a:rPr lang="fr-FR" sz="2800" dirty="0" smtClean="0">
+              <a:rPr lang="fr-FR" sz="2000" dirty="0" smtClean="0">
                 <a:solidFill>
                   <a:srgbClr val="FF0000"/>
                 </a:solidFill>
+                <a:latin typeface="Calibri" panose="020F0502020204030204" pitchFamily="34" charset="0"/>
               </a:rPr>
-              <a:t>Nombres</a:t>
-            </a:r>
-          </a:p>
-          <a:p>
-            <a:pPr lvl="1"/>
-            <a:r>
-              <a:rPr lang="fr-FR" sz="2400" dirty="0" err="1">
-                <a:solidFill>
-                  <a:srgbClr val="FF0000"/>
-                </a:solidFill>
-                <a:latin typeface="Courier New" pitchFamily="49" charset="0"/>
-                <a:cs typeface="Courier New" pitchFamily="49" charset="0"/>
-              </a:rPr>
-              <a:t>i</a:t>
-            </a:r>
-            <a:r>
-              <a:rPr lang="fr-FR" sz="2400" dirty="0" err="1" smtClean="0">
-                <a:solidFill>
-                  <a:srgbClr val="FF0000"/>
-                </a:solidFill>
-                <a:latin typeface="Courier New" pitchFamily="49" charset="0"/>
-                <a:cs typeface="Courier New" pitchFamily="49" charset="0"/>
-              </a:rPr>
-              <a:t>nt</a:t>
-            </a:r>
-            <a:r>
-              <a:rPr lang="fr-FR" sz="2400" dirty="0" smtClean="0">
-                <a:solidFill>
-                  <a:srgbClr val="FF0000"/>
-                </a:solidFill>
-                <a:latin typeface="Courier New" pitchFamily="49" charset="0"/>
-                <a:cs typeface="Courier New" pitchFamily="49" charset="0"/>
-              </a:rPr>
-              <a:t>, long, </a:t>
-            </a:r>
-            <a:r>
-              <a:rPr lang="fr-FR" sz="2400" dirty="0" err="1" smtClean="0">
-                <a:solidFill>
-                  <a:srgbClr val="FF0000"/>
-                </a:solidFill>
-                <a:latin typeface="Courier New" pitchFamily="49" charset="0"/>
-                <a:cs typeface="Courier New" pitchFamily="49" charset="0"/>
-              </a:rPr>
-              <a:t>float</a:t>
-            </a:r>
-            <a:r>
-              <a:rPr lang="fr-FR" sz="2400" dirty="0" smtClean="0">
-                <a:solidFill>
-                  <a:srgbClr val="FF0000"/>
-                </a:solidFill>
-                <a:latin typeface="Courier New" pitchFamily="49" charset="0"/>
-                <a:cs typeface="Courier New" pitchFamily="49" charset="0"/>
-              </a:rPr>
-              <a:t>, </a:t>
-            </a:r>
-            <a:r>
-              <a:rPr lang="fr-FR" sz="2400" dirty="0" err="1" smtClean="0">
-                <a:solidFill>
-                  <a:srgbClr val="FF0000"/>
-                </a:solidFill>
-                <a:latin typeface="Courier New" pitchFamily="49" charset="0"/>
-                <a:cs typeface="Courier New" pitchFamily="49" charset="0"/>
-              </a:rPr>
-              <a:t>complex</a:t>
-            </a:r>
-            <a:r>
-              <a:rPr lang="fr-FR" sz="2400" dirty="0" smtClean="0">
-                <a:solidFill>
-                  <a:srgbClr val="FF0000"/>
-                </a:solidFill>
-                <a:latin typeface="Courier New" pitchFamily="49" charset="0"/>
-                <a:cs typeface="Courier New" pitchFamily="49" charset="0"/>
-              </a:rPr>
-              <a:t>, </a:t>
-            </a:r>
-            <a:r>
-              <a:rPr lang="fr-FR" sz="2400" dirty="0" err="1" smtClean="0">
-                <a:solidFill>
-                  <a:srgbClr val="FF0000"/>
-                </a:solidFill>
-                <a:latin typeface="Courier New" pitchFamily="49" charset="0"/>
-                <a:cs typeface="Courier New" pitchFamily="49" charset="0"/>
-              </a:rPr>
-              <a:t>bool</a:t>
-            </a:r>
-            <a:endParaRPr lang="fr-FR" sz="2400" dirty="0" smtClean="0">
+              <a:t>prompteur</a:t>
+            </a:r>
+            <a:endParaRPr lang="fr-FR" sz="2000" dirty="0">
               <a:solidFill>
                 <a:srgbClr val="FF0000"/>
               </a:solidFill>
-              <a:latin typeface="Courier New" pitchFamily="49" charset="0"/>
-              <a:cs typeface="Courier New" pitchFamily="49" charset="0"/>
+              <a:latin typeface="Calibri" panose="020F0502020204030204" pitchFamily="34" charset="0"/>
             </a:endParaRPr>
           </a:p>
         </p:txBody>
@@ -5101,7 +4775,7 @@
     </p:spTree>
     <p:extLst>
       <p:ext uri="{BB962C8B-B14F-4D97-AF65-F5344CB8AC3E}">
-        <p14:creationId xmlns:p14="http://schemas.microsoft.com/office/powerpoint/2010/main" val="1223347470"/>
+        <p14:creationId xmlns:p14="http://schemas.microsoft.com/office/powerpoint/2010/main" val="1143164526"/>
       </p:ext>
     </p:extLst>
   </p:cSld>
@@ -5152,7 +4826,7 @@
           <a:p>
             <a:r>
               <a:rPr lang="fr-FR" dirty="0" smtClean="0"/>
-              <a:t>Nouvelle séquence</a:t>
+              <a:t>Types de base</a:t>
             </a:r>
             <a:endParaRPr lang="fr-FR" dirty="0"/>
           </a:p>
@@ -5168,641 +4842,111 @@
             <p:ph idx="1"/>
           </p:nvPr>
         </p:nvSpPr>
-        <p:spPr/>
+        <p:spPr>
+          <a:xfrm>
+            <a:off x="457200" y="1417638"/>
+            <a:ext cx="8229600" cy="4708525"/>
+          </a:xfrm>
+        </p:spPr>
         <p:txBody>
           <a:bodyPr/>
           <a:lstStyle/>
           <a:p>
-            <a:endParaRPr lang="fr-FR"/>
-          </a:p>
-        </p:txBody>
-      </p:sp>
-    </p:spTree>
-    <p:extLst>
-      <p:ext uri="{BB962C8B-B14F-4D97-AF65-F5344CB8AC3E}">
-        <p14:creationId xmlns:p14="http://schemas.microsoft.com/office/powerpoint/2010/main" val="114093037"/>
-      </p:ext>
-    </p:extLst>
-  </p:cSld>
-  <p:clrMapOvr>
-    <a:masterClrMapping/>
-  </p:clrMapOvr>
-  <p:timing>
-    <p:tnLst>
-      <p:par>
-        <p:cTn id="1" dur="indefinite" restart="never" nodeType="tmRoot"/>
-      </p:par>
-    </p:tnLst>
-  </p:timing>
-</p:sld>
-</file>
-
-<file path=ppt/slides/slide4.xml><?xml version="1.0" encoding="utf-8"?>
-<p:sld xmlns:a="http://schemas.openxmlformats.org/drawingml/2006/main" xmlns:r="http://schemas.openxmlformats.org/officeDocument/2006/relationships" xmlns:p="http://schemas.openxmlformats.org/presentationml/2006/main">
-  <p:cSld>
-    <p:spTree>
-      <p:nvGrpSpPr>
-        <p:cNvPr id="1" name=""/>
-        <p:cNvGrpSpPr/>
-        <p:nvPr/>
-      </p:nvGrpSpPr>
-      <p:grpSpPr>
-        <a:xfrm>
-          <a:off x="0" y="0"/>
-          <a:ext cx="0" cy="0"/>
-          <a:chOff x="0" y="0"/>
-          <a:chExt cx="0" cy="0"/>
-        </a:xfrm>
-      </p:grpSpPr>
-      <p:sp>
-        <p:nvSpPr>
-          <p:cNvPr id="2" name="Titre 1"/>
-          <p:cNvSpPr>
-            <a:spLocks noGrp="1"/>
-          </p:cNvSpPr>
-          <p:nvPr>
-            <p:ph type="title"/>
-          </p:nvPr>
-        </p:nvSpPr>
-        <p:spPr/>
-        <p:txBody>
-          <a:bodyPr/>
-          <a:lstStyle/>
-          <a:p>
-            <a:r>
-              <a:rPr lang="fr-FR" dirty="0" smtClean="0"/>
-              <a:t>Problème avec les </a:t>
-            </a:r>
-            <a:r>
-              <a:rPr lang="fr-FR" dirty="0" err="1" smtClean="0">
-                <a:latin typeface="Courier New" panose="02070309020205020404" pitchFamily="49" charset="0"/>
-                <a:cs typeface="Courier New" panose="02070309020205020404" pitchFamily="49" charset="0"/>
+            <a:r>
+              <a:rPr lang="fr-FR" sz="2800" dirty="0" smtClean="0">
+                <a:solidFill>
+                  <a:srgbClr val="FF0000"/>
+                </a:solidFill>
               </a:rPr>
-              <a:t>float</a:t>
-            </a:r>
-            <a:endParaRPr lang="fr-FR" dirty="0">
-              <a:latin typeface="Courier New" panose="02070309020205020404" pitchFamily="49" charset="0"/>
-              <a:cs typeface="Courier New" panose="02070309020205020404" pitchFamily="49" charset="0"/>
-            </a:endParaRPr>
-          </a:p>
-        </p:txBody>
-      </p:sp>
-      <p:sp>
-        <p:nvSpPr>
-          <p:cNvPr id="3" name="Espace réservé du contenu 2"/>
-          <p:cNvSpPr>
-            <a:spLocks noGrp="1"/>
-          </p:cNvSpPr>
-          <p:nvPr>
-            <p:ph idx="1"/>
-          </p:nvPr>
-        </p:nvSpPr>
-        <p:spPr>
-          <a:xfrm>
-            <a:off x="457200" y="1600200"/>
-            <a:ext cx="8686800" cy="4525963"/>
-          </a:xfrm>
-        </p:spPr>
-        <p:txBody>
-          <a:bodyPr/>
-          <a:lstStyle/>
-          <a:p>
-            <a:r>
-              <a:rPr lang="fr-FR" dirty="0" smtClean="0"/>
-              <a:t>Les </a:t>
-            </a:r>
-            <a:r>
-              <a:rPr lang="fr-FR" dirty="0" err="1" smtClean="0">
-                <a:latin typeface="Courier New" panose="02070309020205020404" pitchFamily="49" charset="0"/>
-                <a:cs typeface="Courier New" panose="02070309020205020404" pitchFamily="49" charset="0"/>
-              </a:rPr>
-              <a:t>float</a:t>
-            </a:r>
-            <a:r>
-              <a:rPr lang="fr-FR" dirty="0" smtClean="0"/>
-              <a:t> sont représentés en machine comme des fractions en base </a:t>
-            </a:r>
-            <a:r>
-              <a:rPr lang="fr-FR" dirty="0" smtClean="0"/>
-              <a:t>2 et non des fractions décimales</a:t>
-            </a:r>
-            <a:endParaRPr lang="fr-FR" dirty="0"/>
+              <a:t>Nombres</a:t>
+            </a:r>
           </a:p>
           <a:p>
             <a:pPr lvl="1"/>
             <a:r>
-              <a:rPr lang="fr-FR" dirty="0" smtClean="0"/>
-              <a:t>Les fractions décimales sont des approximations lorsqu’elles n’ont pas de représentation </a:t>
-            </a:r>
-            <a:r>
-              <a:rPr lang="fr-FR" smtClean="0"/>
-              <a:t>en base 2</a:t>
-            </a:r>
-            <a:endParaRPr lang="fr-FR" dirty="0" smtClean="0"/>
-          </a:p>
-          <a:p>
-            <a:pPr lvl="1"/>
-            <a:r>
-              <a:rPr lang="fr-FR" dirty="0" smtClean="0"/>
-              <a:t>Ça n’est pas une spécificité de </a:t>
-            </a:r>
-            <a:r>
-              <a:rPr lang="fr-FR" dirty="0" smtClean="0"/>
-              <a:t>Python</a:t>
-            </a:r>
-            <a:endParaRPr lang="fr-FR" dirty="0" smtClean="0"/>
-          </a:p>
-          <a:p>
-            <a:pPr lvl="1"/>
-            <a:endParaRPr lang="fr-FR" sz="2000" dirty="0" smtClean="0">
-              <a:latin typeface="Courier New" pitchFamily="49" charset="0"/>
-              <a:cs typeface="Courier New" pitchFamily="49" charset="0"/>
-            </a:endParaRPr>
-          </a:p>
-          <a:p>
-            <a:pPr marL="0" indent="0">
-              <a:buNone/>
-            </a:pPr>
-            <a:r>
-              <a:rPr lang="fr-FR" sz="2000" dirty="0" smtClean="0">
+              <a:rPr lang="fr-FR" sz="2400" dirty="0" err="1">
+                <a:solidFill>
+                  <a:srgbClr val="FF0000"/>
+                </a:solidFill>
                 <a:latin typeface="Courier New" pitchFamily="49" charset="0"/>
                 <a:cs typeface="Courier New" pitchFamily="49" charset="0"/>
               </a:rPr>
-              <a:t>&gt;&gt;&gt; </a:t>
-            </a:r>
-            <a:r>
-              <a:rPr lang="fr-FR" sz="2000" dirty="0">
+              <a:t>i</a:t>
+            </a:r>
+            <a:r>
+              <a:rPr lang="fr-FR" sz="2400" dirty="0" err="1" smtClean="0">
+                <a:solidFill>
+                  <a:srgbClr val="FF0000"/>
+                </a:solidFill>
                 <a:latin typeface="Courier New" pitchFamily="49" charset="0"/>
                 <a:cs typeface="Courier New" pitchFamily="49" charset="0"/>
               </a:rPr>
-              <a:t>0.1+0.2</a:t>
-            </a:r>
-          </a:p>
-          <a:p>
-            <a:pPr marL="0" indent="0">
-              <a:buNone/>
-            </a:pPr>
-            <a:r>
-              <a:rPr lang="fr-FR" sz="2000" dirty="0" smtClean="0">
+              <a:t>nt</a:t>
+            </a:r>
+            <a:r>
+              <a:rPr lang="fr-FR" sz="2400" dirty="0" smtClean="0">
+                <a:solidFill>
+                  <a:srgbClr val="FF0000"/>
+                </a:solidFill>
                 <a:latin typeface="Courier New" pitchFamily="49" charset="0"/>
                 <a:cs typeface="Courier New" pitchFamily="49" charset="0"/>
               </a:rPr>
-              <a:t>0.30000000000000004</a:t>
-            </a:r>
-          </a:p>
-          <a:p>
-            <a:endParaRPr lang="fr-FR" dirty="0"/>
-          </a:p>
-        </p:txBody>
-      </p:sp>
-    </p:spTree>
-    <p:extLst>
-      <p:ext uri="{BB962C8B-B14F-4D97-AF65-F5344CB8AC3E}">
-        <p14:creationId xmlns:p14="http://schemas.microsoft.com/office/powerpoint/2010/main" val="2292669406"/>
-      </p:ext>
-    </p:extLst>
-  </p:cSld>
-  <p:clrMapOvr>
-    <a:masterClrMapping/>
-  </p:clrMapOvr>
-  <p:timing>
-    <p:tnLst>
-      <p:par>
-        <p:cTn id="1" dur="indefinite" restart="never" nodeType="tmRoot">
-          <p:childTnLst>
-            <p:seq concurrent="1" nextAc="seek">
-              <p:cTn id="2" dur="indefinite" nodeType="mainSeq">
-                <p:childTnLst>
-                  <p:par>
-                    <p:cTn id="3" fill="hold">
-                      <p:stCondLst>
-                        <p:cond delay="indefinite"/>
-                      </p:stCondLst>
-                      <p:childTnLst>
-                        <p:par>
-                          <p:cTn id="4" fill="hold">
-                            <p:stCondLst>
-                              <p:cond delay="0"/>
-                            </p:stCondLst>
-                            <p:childTnLst>
-                              <p:par>
-                                <p:cTn id="5" presetID="10" presetClass="entr" presetSubtype="0" fill="hold" nodeType="clickEffect">
-                                  <p:stCondLst>
-                                    <p:cond delay="0"/>
-                                  </p:stCondLst>
-                                  <p:childTnLst>
-                                    <p:set>
-                                      <p:cBhvr>
-                                        <p:cTn id="6" dur="1" fill="hold">
-                                          <p:stCondLst>
-                                            <p:cond delay="0"/>
-                                          </p:stCondLst>
-                                        </p:cTn>
-                                        <p:tgtEl>
-                                          <p:spTgt spid="3">
-                                            <p:txEl>
-                                              <p:pRg st="0" end="0"/>
-                                            </p:txEl>
-                                          </p:spTgt>
-                                        </p:tgtEl>
-                                        <p:attrNameLst>
-                                          <p:attrName>style.visibility</p:attrName>
-                                        </p:attrNameLst>
-                                      </p:cBhvr>
-                                      <p:to>
-                                        <p:strVal val="visible"/>
-                                      </p:to>
-                                    </p:set>
-                                    <p:animEffect transition="in" filter="fade">
-                                      <p:cBhvr>
-                                        <p:cTn id="7" dur="500"/>
-                                        <p:tgtEl>
-                                          <p:spTgt spid="3">
-                                            <p:txEl>
-                                              <p:pRg st="0" end="0"/>
-                                            </p:txEl>
-                                          </p:spTgt>
-                                        </p:tgtEl>
-                                      </p:cBhvr>
-                                    </p:animEffect>
-                                  </p:childTnLst>
-                                </p:cTn>
-                              </p:par>
-                            </p:childTnLst>
-                          </p:cTn>
-                        </p:par>
-                      </p:childTnLst>
-                    </p:cTn>
-                  </p:par>
-                  <p:par>
-                    <p:cTn id="8" fill="hold">
-                      <p:stCondLst>
-                        <p:cond delay="indefinite"/>
-                      </p:stCondLst>
-                      <p:childTnLst>
-                        <p:par>
-                          <p:cTn id="9" fill="hold">
-                            <p:stCondLst>
-                              <p:cond delay="0"/>
-                            </p:stCondLst>
-                            <p:childTnLst>
-                              <p:par>
-                                <p:cTn id="10" presetID="10" presetClass="entr" presetSubtype="0" fill="hold" nodeType="clickEffect">
-                                  <p:stCondLst>
-                                    <p:cond delay="0"/>
-                                  </p:stCondLst>
-                                  <p:childTnLst>
-                                    <p:set>
-                                      <p:cBhvr>
-                                        <p:cTn id="11" dur="1" fill="hold">
-                                          <p:stCondLst>
-                                            <p:cond delay="0"/>
-                                          </p:stCondLst>
-                                        </p:cTn>
-                                        <p:tgtEl>
-                                          <p:spTgt spid="3">
-                                            <p:txEl>
-                                              <p:pRg st="1" end="1"/>
-                                            </p:txEl>
-                                          </p:spTgt>
-                                        </p:tgtEl>
-                                        <p:attrNameLst>
-                                          <p:attrName>style.visibility</p:attrName>
-                                        </p:attrNameLst>
-                                      </p:cBhvr>
-                                      <p:to>
-                                        <p:strVal val="visible"/>
-                                      </p:to>
-                                    </p:set>
-                                    <p:animEffect transition="in" filter="fade">
-                                      <p:cBhvr>
-                                        <p:cTn id="12" dur="500"/>
-                                        <p:tgtEl>
-                                          <p:spTgt spid="3">
-                                            <p:txEl>
-                                              <p:pRg st="1" end="1"/>
-                                            </p:txEl>
-                                          </p:spTgt>
-                                        </p:tgtEl>
-                                      </p:cBhvr>
-                                    </p:animEffect>
-                                  </p:childTnLst>
-                                </p:cTn>
-                              </p:par>
-                            </p:childTnLst>
-                          </p:cTn>
-                        </p:par>
-                      </p:childTnLst>
-                    </p:cTn>
-                  </p:par>
-                  <p:par>
-                    <p:cTn id="13" fill="hold">
-                      <p:stCondLst>
-                        <p:cond delay="indefinite"/>
-                      </p:stCondLst>
-                      <p:childTnLst>
-                        <p:par>
-                          <p:cTn id="14" fill="hold">
-                            <p:stCondLst>
-                              <p:cond delay="0"/>
-                            </p:stCondLst>
-                            <p:childTnLst>
-                              <p:par>
-                                <p:cTn id="15" presetID="10" presetClass="entr" presetSubtype="0" fill="hold" nodeType="clickEffect">
-                                  <p:stCondLst>
-                                    <p:cond delay="0"/>
-                                  </p:stCondLst>
-                                  <p:childTnLst>
-                                    <p:set>
-                                      <p:cBhvr>
-                                        <p:cTn id="16" dur="1" fill="hold">
-                                          <p:stCondLst>
-                                            <p:cond delay="0"/>
-                                          </p:stCondLst>
-                                        </p:cTn>
-                                        <p:tgtEl>
-                                          <p:spTgt spid="3">
-                                            <p:txEl>
-                                              <p:pRg st="2" end="2"/>
-                                            </p:txEl>
-                                          </p:spTgt>
-                                        </p:tgtEl>
-                                        <p:attrNameLst>
-                                          <p:attrName>style.visibility</p:attrName>
-                                        </p:attrNameLst>
-                                      </p:cBhvr>
-                                      <p:to>
-                                        <p:strVal val="visible"/>
-                                      </p:to>
-                                    </p:set>
-                                    <p:animEffect transition="in" filter="fade">
-                                      <p:cBhvr>
-                                        <p:cTn id="17" dur="500"/>
-                                        <p:tgtEl>
-                                          <p:spTgt spid="3">
-                                            <p:txEl>
-                                              <p:pRg st="2" end="2"/>
-                                            </p:txEl>
-                                          </p:spTgt>
-                                        </p:tgtEl>
-                                      </p:cBhvr>
-                                    </p:animEffect>
-                                  </p:childTnLst>
-                                </p:cTn>
-                              </p:par>
-                            </p:childTnLst>
-                          </p:cTn>
-                        </p:par>
-                      </p:childTnLst>
-                    </p:cTn>
-                  </p:par>
-                  <p:par>
-                    <p:cTn id="18" fill="hold">
-                      <p:stCondLst>
-                        <p:cond delay="indefinite"/>
-                      </p:stCondLst>
-                      <p:childTnLst>
-                        <p:par>
-                          <p:cTn id="19" fill="hold">
-                            <p:stCondLst>
-                              <p:cond delay="0"/>
-                            </p:stCondLst>
-                            <p:childTnLst>
-                              <p:par>
-                                <p:cTn id="20" presetID="10" presetClass="entr" presetSubtype="0" fill="hold" nodeType="clickEffect">
-                                  <p:stCondLst>
-                                    <p:cond delay="0"/>
-                                  </p:stCondLst>
-                                  <p:childTnLst>
-                                    <p:set>
-                                      <p:cBhvr>
-                                        <p:cTn id="21" dur="1" fill="hold">
-                                          <p:stCondLst>
-                                            <p:cond delay="0"/>
-                                          </p:stCondLst>
-                                        </p:cTn>
-                                        <p:tgtEl>
-                                          <p:spTgt spid="3">
-                                            <p:txEl>
-                                              <p:pRg st="4" end="4"/>
-                                            </p:txEl>
-                                          </p:spTgt>
-                                        </p:tgtEl>
-                                        <p:attrNameLst>
-                                          <p:attrName>style.visibility</p:attrName>
-                                        </p:attrNameLst>
-                                      </p:cBhvr>
-                                      <p:to>
-                                        <p:strVal val="visible"/>
-                                      </p:to>
-                                    </p:set>
-                                    <p:animEffect transition="in" filter="fade">
-                                      <p:cBhvr>
-                                        <p:cTn id="22" dur="500"/>
-                                        <p:tgtEl>
-                                          <p:spTgt spid="3">
-                                            <p:txEl>
-                                              <p:pRg st="4" end="4"/>
-                                            </p:txEl>
-                                          </p:spTgt>
-                                        </p:tgtEl>
-                                      </p:cBhvr>
-                                    </p:animEffect>
-                                  </p:childTnLst>
-                                </p:cTn>
-                              </p:par>
-                              <p:par>
-                                <p:cTn id="23" presetID="10" presetClass="entr" presetSubtype="0" fill="hold" nodeType="withEffect">
-                                  <p:stCondLst>
-                                    <p:cond delay="0"/>
-                                  </p:stCondLst>
-                                  <p:childTnLst>
-                                    <p:set>
-                                      <p:cBhvr>
-                                        <p:cTn id="24" dur="1" fill="hold">
-                                          <p:stCondLst>
-                                            <p:cond delay="0"/>
-                                          </p:stCondLst>
-                                        </p:cTn>
-                                        <p:tgtEl>
-                                          <p:spTgt spid="3">
-                                            <p:txEl>
-                                              <p:pRg st="5" end="5"/>
-                                            </p:txEl>
-                                          </p:spTgt>
-                                        </p:tgtEl>
-                                        <p:attrNameLst>
-                                          <p:attrName>style.visibility</p:attrName>
-                                        </p:attrNameLst>
-                                      </p:cBhvr>
-                                      <p:to>
-                                        <p:strVal val="visible"/>
-                                      </p:to>
-                                    </p:set>
-                                    <p:animEffect transition="in" filter="fade">
-                                      <p:cBhvr>
-                                        <p:cTn id="25" dur="500"/>
-                                        <p:tgtEl>
-                                          <p:spTgt spid="3">
-                                            <p:txEl>
-                                              <p:pRg st="5" end="5"/>
-                                            </p:txEl>
-                                          </p:spTgt>
-                                        </p:tgtEl>
-                                      </p:cBhvr>
-                                    </p:animEffect>
-                                  </p:childTnLst>
-                                </p:cTn>
-                              </p:par>
-                            </p:childTnLst>
-                          </p:cTn>
-                        </p:par>
-                      </p:childTnLst>
-                    </p:cTn>
-                  </p:par>
-                </p:childTnLst>
-              </p:cTn>
-              <p:prevCondLst>
-                <p:cond evt="onPrev" delay="0">
-                  <p:tgtEl>
-                    <p:sldTgt/>
-                  </p:tgtEl>
-                </p:cond>
-              </p:prevCondLst>
-              <p:nextCondLst>
-                <p:cond evt="onNext" delay="0">
-                  <p:tgtEl>
-                    <p:sldTgt/>
-                  </p:tgtEl>
-                </p:cond>
-              </p:nextCondLst>
-            </p:seq>
-          </p:childTnLst>
-        </p:cTn>
-      </p:par>
-    </p:tnLst>
-  </p:timing>
-</p:sld>
-</file>
-
-<file path=ppt/slides/slide5.xml><?xml version="1.0" encoding="utf-8"?>
-<p:sld xmlns:a="http://schemas.openxmlformats.org/drawingml/2006/main" xmlns:r="http://schemas.openxmlformats.org/officeDocument/2006/relationships" xmlns:p="http://schemas.openxmlformats.org/presentationml/2006/main">
-  <p:cSld>
-    <p:spTree>
-      <p:nvGrpSpPr>
-        <p:cNvPr id="1" name=""/>
-        <p:cNvGrpSpPr/>
-        <p:nvPr/>
-      </p:nvGrpSpPr>
-      <p:grpSpPr>
-        <a:xfrm>
-          <a:off x="0" y="0"/>
-          <a:ext cx="0" cy="0"/>
-          <a:chOff x="0" y="0"/>
-          <a:chExt cx="0" cy="0"/>
-        </a:xfrm>
-      </p:grpSpPr>
-      <p:sp>
-        <p:nvSpPr>
-          <p:cNvPr id="2" name="Titre 1"/>
-          <p:cNvSpPr>
-            <a:spLocks noGrp="1"/>
-          </p:cNvSpPr>
-          <p:nvPr>
-            <p:ph type="title"/>
-          </p:nvPr>
-        </p:nvSpPr>
-        <p:spPr/>
-        <p:txBody>
-          <a:bodyPr/>
-          <a:lstStyle/>
-          <a:p>
-            <a:r>
-              <a:rPr lang="fr-FR" dirty="0"/>
-              <a:t>Problème avec les </a:t>
-            </a:r>
-            <a:r>
-              <a:rPr lang="fr-FR" dirty="0" err="1">
-                <a:latin typeface="Courier New" panose="02070309020205020404" pitchFamily="49" charset="0"/>
-                <a:cs typeface="Courier New" panose="02070309020205020404" pitchFamily="49" charset="0"/>
-              </a:rPr>
-              <a:t>float</a:t>
-            </a:r>
-            <a:endParaRPr lang="fr-FR" dirty="0"/>
-          </a:p>
-        </p:txBody>
-      </p:sp>
-      <p:sp>
-        <p:nvSpPr>
-          <p:cNvPr id="3" name="Espace réservé du contenu 2"/>
-          <p:cNvSpPr>
-            <a:spLocks noGrp="1"/>
-          </p:cNvSpPr>
-          <p:nvPr>
-            <p:ph idx="1"/>
-          </p:nvPr>
-        </p:nvSpPr>
-        <p:spPr>
-          <a:xfrm>
-            <a:off x="457200" y="1600200"/>
-            <a:ext cx="8686800" cy="4525963"/>
-          </a:xfrm>
-        </p:spPr>
-        <p:txBody>
-          <a:bodyPr/>
-          <a:lstStyle/>
-          <a:p>
-            <a:r>
-              <a:rPr lang="fr-FR" dirty="0" smtClean="0"/>
-              <a:t>Ce problème n’est pas spécifique </a:t>
-            </a:r>
-            <a:r>
-              <a:rPr lang="fr-FR" dirty="0"/>
-              <a:t>à Python</a:t>
-            </a:r>
-          </a:p>
-          <a:p>
-            <a:pPr lvl="1"/>
-            <a:r>
-              <a:rPr lang="fr-FR" dirty="0"/>
-              <a:t>Si vous ne faites pas de l’analyse numérique, ce problème n’a probablement aucun impact pour vous</a:t>
-            </a:r>
-          </a:p>
-          <a:p>
-            <a:pPr lvl="1"/>
-            <a:r>
-              <a:rPr lang="fr-FR" dirty="0"/>
-              <a:t>Sinon, vous êtes déjà au </a:t>
-            </a:r>
-            <a:r>
-              <a:rPr lang="fr-FR" dirty="0" smtClean="0"/>
-              <a:t>courant</a:t>
-            </a:r>
-          </a:p>
-          <a:p>
-            <a:r>
-              <a:rPr lang="fr-FR" dirty="0" smtClean="0"/>
-              <a:t>Il existe le module </a:t>
-            </a:r>
-            <a:r>
-              <a:rPr lang="fr-FR" dirty="0" err="1" smtClean="0">
-                <a:latin typeface="Courier New" pitchFamily="49" charset="0"/>
-                <a:cs typeface="Courier New" pitchFamily="49" charset="0"/>
-              </a:rPr>
-              <a:t>decimal</a:t>
-            </a:r>
-            <a:r>
-              <a:rPr lang="fr-FR" dirty="0" smtClean="0"/>
-              <a:t> pour travailler sur des nombres décimaux avec plus de précision et de control qu’avec le type </a:t>
-            </a:r>
-            <a:r>
-              <a:rPr lang="fr-FR" dirty="0" err="1" smtClean="0">
+              <a:t>, long, </a:t>
+            </a:r>
+            <a:r>
+              <a:rPr lang="fr-FR" sz="2400" dirty="0" err="1" smtClean="0">
+                <a:solidFill>
+                  <a:srgbClr val="FF0000"/>
+                </a:solidFill>
                 <a:latin typeface="Courier New" pitchFamily="49" charset="0"/>
                 <a:cs typeface="Courier New" pitchFamily="49" charset="0"/>
               </a:rPr>
               <a:t>float</a:t>
             </a:r>
-            <a:endParaRPr lang="fr-FR" dirty="0">
+            <a:r>
+              <a:rPr lang="fr-FR" sz="2400" dirty="0" smtClean="0">
+                <a:solidFill>
+                  <a:srgbClr val="FF0000"/>
+                </a:solidFill>
+                <a:latin typeface="Courier New" pitchFamily="49" charset="0"/>
+                <a:cs typeface="Courier New" pitchFamily="49" charset="0"/>
+              </a:rPr>
+              <a:t>, </a:t>
+            </a:r>
+            <a:r>
+              <a:rPr lang="fr-FR" sz="2400" dirty="0" err="1" smtClean="0">
+                <a:solidFill>
+                  <a:srgbClr val="FF0000"/>
+                </a:solidFill>
+                <a:latin typeface="Courier New" pitchFamily="49" charset="0"/>
+                <a:cs typeface="Courier New" pitchFamily="49" charset="0"/>
+              </a:rPr>
+              <a:t>complex</a:t>
+            </a:r>
+            <a:r>
+              <a:rPr lang="fr-FR" sz="2400" dirty="0" smtClean="0">
+                <a:solidFill>
+                  <a:srgbClr val="FF0000"/>
+                </a:solidFill>
+                <a:latin typeface="Courier New" pitchFamily="49" charset="0"/>
+                <a:cs typeface="Courier New" pitchFamily="49" charset="0"/>
+              </a:rPr>
+              <a:t>, </a:t>
+            </a:r>
+            <a:r>
+              <a:rPr lang="fr-FR" sz="2400" dirty="0" err="1" smtClean="0">
+                <a:solidFill>
+                  <a:srgbClr val="FF0000"/>
+                </a:solidFill>
+                <a:latin typeface="Courier New" pitchFamily="49" charset="0"/>
+                <a:cs typeface="Courier New" pitchFamily="49" charset="0"/>
+              </a:rPr>
+              <a:t>bool</a:t>
+            </a:r>
+            <a:endParaRPr lang="fr-FR" sz="2400" dirty="0" smtClean="0">
+              <a:solidFill>
+                <a:srgbClr val="FF0000"/>
+              </a:solidFill>
               <a:latin typeface="Courier New" pitchFamily="49" charset="0"/>
               <a:cs typeface="Courier New" pitchFamily="49" charset="0"/>
             </a:endParaRPr>
@@ -5812,207 +4956,7 @@
     </p:spTree>
     <p:extLst>
       <p:ext uri="{BB962C8B-B14F-4D97-AF65-F5344CB8AC3E}">
-        <p14:creationId xmlns:p14="http://schemas.microsoft.com/office/powerpoint/2010/main" val="984672825"/>
-      </p:ext>
-    </p:extLst>
-  </p:cSld>
-  <p:clrMapOvr>
-    <a:masterClrMapping/>
-  </p:clrMapOvr>
-  <p:timing>
-    <p:tnLst>
-      <p:par>
-        <p:cTn id="1" dur="indefinite" restart="never" nodeType="tmRoot">
-          <p:childTnLst>
-            <p:seq concurrent="1" nextAc="seek">
-              <p:cTn id="2" dur="indefinite" nodeType="mainSeq">
-                <p:childTnLst>
-                  <p:par>
-                    <p:cTn id="3" fill="hold">
-                      <p:stCondLst>
-                        <p:cond delay="indefinite"/>
-                      </p:stCondLst>
-                      <p:childTnLst>
-                        <p:par>
-                          <p:cTn id="4" fill="hold">
-                            <p:stCondLst>
-                              <p:cond delay="0"/>
-                            </p:stCondLst>
-                            <p:childTnLst>
-                              <p:par>
-                                <p:cTn id="5" presetID="10" presetClass="entr" presetSubtype="0" fill="hold" nodeType="clickEffect">
-                                  <p:stCondLst>
-                                    <p:cond delay="0"/>
-                                  </p:stCondLst>
-                                  <p:childTnLst>
-                                    <p:set>
-                                      <p:cBhvr>
-                                        <p:cTn id="6" dur="1" fill="hold">
-                                          <p:stCondLst>
-                                            <p:cond delay="0"/>
-                                          </p:stCondLst>
-                                        </p:cTn>
-                                        <p:tgtEl>
-                                          <p:spTgt spid="3">
-                                            <p:txEl>
-                                              <p:pRg st="3" end="3"/>
-                                            </p:txEl>
-                                          </p:spTgt>
-                                        </p:tgtEl>
-                                        <p:attrNameLst>
-                                          <p:attrName>style.visibility</p:attrName>
-                                        </p:attrNameLst>
-                                      </p:cBhvr>
-                                      <p:to>
-                                        <p:strVal val="visible"/>
-                                      </p:to>
-                                    </p:set>
-                                    <p:animEffect transition="in" filter="fade">
-                                      <p:cBhvr>
-                                        <p:cTn id="7" dur="500"/>
-                                        <p:tgtEl>
-                                          <p:spTgt spid="3">
-                                            <p:txEl>
-                                              <p:pRg st="3" end="3"/>
-                                            </p:txEl>
-                                          </p:spTgt>
-                                        </p:tgtEl>
-                                      </p:cBhvr>
-                                    </p:animEffect>
-                                  </p:childTnLst>
-                                </p:cTn>
-                              </p:par>
-                            </p:childTnLst>
-                          </p:cTn>
-                        </p:par>
-                      </p:childTnLst>
-                    </p:cTn>
-                  </p:par>
-                </p:childTnLst>
-              </p:cTn>
-              <p:prevCondLst>
-                <p:cond evt="onPrev" delay="0">
-                  <p:tgtEl>
-                    <p:sldTgt/>
-                  </p:tgtEl>
-                </p:cond>
-              </p:prevCondLst>
-              <p:nextCondLst>
-                <p:cond evt="onNext" delay="0">
-                  <p:tgtEl>
-                    <p:sldTgt/>
-                  </p:tgtEl>
-                </p:cond>
-              </p:nextCondLst>
-            </p:seq>
-          </p:childTnLst>
-        </p:cTn>
-      </p:par>
-    </p:tnLst>
-  </p:timing>
-</p:sld>
-</file>
-
-<file path=ppt/slides/slide6.xml><?xml version="1.0" encoding="utf-8"?>
-<p:sld xmlns:a="http://schemas.openxmlformats.org/drawingml/2006/main" xmlns:r="http://schemas.openxmlformats.org/officeDocument/2006/relationships" xmlns:p="http://schemas.openxmlformats.org/presentationml/2006/main">
-  <p:cSld>
-    <p:spTree>
-      <p:nvGrpSpPr>
-        <p:cNvPr id="1" name=""/>
-        <p:cNvGrpSpPr/>
-        <p:nvPr/>
-      </p:nvGrpSpPr>
-      <p:grpSpPr>
-        <a:xfrm>
-          <a:off x="0" y="0"/>
-          <a:ext cx="0" cy="0"/>
-          <a:chOff x="0" y="0"/>
-          <a:chExt cx="0" cy="0"/>
-        </a:xfrm>
-      </p:grpSpPr>
-      <p:sp>
-        <p:nvSpPr>
-          <p:cNvPr id="2" name="Titre 1"/>
-          <p:cNvSpPr>
-            <a:spLocks noGrp="1"/>
-          </p:cNvSpPr>
-          <p:nvPr>
-            <p:ph type="title"/>
-          </p:nvPr>
-        </p:nvSpPr>
-        <p:spPr/>
-        <p:txBody>
-          <a:bodyPr/>
-          <a:lstStyle/>
-          <a:p>
-            <a:r>
-              <a:rPr lang="fr-FR" dirty="0"/>
-              <a:t>Problème avec les </a:t>
-            </a:r>
-            <a:r>
-              <a:rPr lang="fr-FR" dirty="0" err="1">
-                <a:latin typeface="Courier New" panose="02070309020205020404" pitchFamily="49" charset="0"/>
-                <a:cs typeface="Courier New" panose="02070309020205020404" pitchFamily="49" charset="0"/>
-              </a:rPr>
-              <a:t>float</a:t>
-            </a:r>
-            <a:endParaRPr lang="fr-FR" dirty="0"/>
-          </a:p>
-        </p:txBody>
-      </p:sp>
-      <p:sp>
-        <p:nvSpPr>
-          <p:cNvPr id="3" name="Espace réservé du contenu 2"/>
-          <p:cNvSpPr>
-            <a:spLocks noGrp="1"/>
-          </p:cNvSpPr>
-          <p:nvPr>
-            <p:ph idx="1"/>
-          </p:nvPr>
-        </p:nvSpPr>
-        <p:spPr>
-          <a:xfrm>
-            <a:off x="457200" y="1600200"/>
-            <a:ext cx="8686800" cy="4525963"/>
-          </a:xfrm>
-        </p:spPr>
-        <p:txBody>
-          <a:bodyPr/>
-          <a:lstStyle/>
-          <a:p>
-            <a:r>
-              <a:rPr lang="fr-FR" dirty="0" smtClean="0"/>
-              <a:t>Pour aller plus loin</a:t>
-            </a:r>
-          </a:p>
-          <a:p>
-            <a:pPr lvl="1"/>
-            <a:r>
-              <a:rPr lang="fr-FR" dirty="0" smtClean="0"/>
-              <a:t>Tutoriel Python</a:t>
-            </a:r>
-          </a:p>
-          <a:p>
-            <a:pPr lvl="2"/>
-            <a:r>
-              <a:rPr lang="fr-FR" dirty="0" smtClean="0"/>
-              <a:t>14. </a:t>
-            </a:r>
-            <a:r>
-              <a:rPr lang="en-US" dirty="0"/>
-              <a:t>Floating Point Arithmetic: Issues </a:t>
-            </a:r>
-            <a:r>
-              <a:rPr lang="en-US" dirty="0" smtClean="0"/>
-              <a:t>and Limitations</a:t>
-            </a:r>
-          </a:p>
-        </p:txBody>
-      </p:sp>
-    </p:spTree>
-    <p:extLst>
-      <p:ext uri="{BB962C8B-B14F-4D97-AF65-F5344CB8AC3E}">
-        <p14:creationId xmlns:p14="http://schemas.microsoft.com/office/powerpoint/2010/main" val="643941153"/>
+        <p14:creationId xmlns:p14="http://schemas.microsoft.com/office/powerpoint/2010/main" val="1223347470"/>
       </p:ext>
     </p:extLst>
   </p:cSld>

</xml_diff>

<commit_message>
added a file for references to give as a companion document to students
</commit_message>
<xml_diff>
--- a/semaine2/semaine2-1.pptx
+++ b/semaine2/semaine2-1.pptx
@@ -5,15 +5,17 @@
     <p:sldMasterId id="2147483649" r:id="rId1"/>
   </p:sldMasterIdLst>
   <p:notesMasterIdLst>
-    <p:notesMasterId r:id="rId5"/>
+    <p:notesMasterId r:id="rId7"/>
   </p:notesMasterIdLst>
   <p:handoutMasterIdLst>
-    <p:handoutMasterId r:id="rId6"/>
+    <p:handoutMasterId r:id="rId8"/>
   </p:handoutMasterIdLst>
   <p:sldIdLst>
     <p:sldId id="893" r:id="rId2"/>
     <p:sldId id="895" r:id="rId3"/>
-    <p:sldId id="891" r:id="rId4"/>
+    <p:sldId id="896" r:id="rId4"/>
+    <p:sldId id="897" r:id="rId5"/>
+    <p:sldId id="891" r:id="rId6"/>
   </p:sldIdLst>
   <p:sldSz cx="9144000" cy="6858000" type="screen4x3"/>
   <p:notesSz cx="7099300" cy="10234613"/>
@@ -149,6 +151,8 @@
           <p14:sldIdLst>
             <p14:sldId id="893"/>
             <p14:sldId id="895"/>
+            <p14:sldId id="896"/>
+            <p14:sldId id="897"/>
             <p14:sldId id="891"/>
           </p14:sldIdLst>
         </p14:section>
@@ -1131,17 +1135,17 @@
           <a:p>
             <a:r>
               <a:rPr lang="fr-FR" dirty="0" smtClean="0"/>
-              <a:t>Immutable est un néologisme</a:t>
+              <a:t>Comment manipule-t-on</a:t>
             </a:r>
             <a:r>
               <a:rPr lang="fr-FR" baseline="0" dirty="0" smtClean="0"/>
-              <a:t> (immuable en français), mais il permet </a:t>
+              <a:t> des objets en Python ?</a:t>
             </a:r>
           </a:p>
           <a:p>
             <a:r>
               <a:rPr lang="fr-FR" baseline="0" dirty="0" smtClean="0"/>
-              <a:t>Un meilleur parallèle avec la doc anglaise. </a:t>
+              <a:t>Comme dans tous les langages de programmation on peut donner un nom, on appelle ce nom une variable. </a:t>
             </a:r>
           </a:p>
           <a:p>
@@ -1150,21 +1154,16 @@
           <a:p>
             <a:r>
               <a:rPr lang="fr-FR" baseline="0" dirty="0" smtClean="0"/>
-              <a:t>Documentation sur tous les </a:t>
-            </a:r>
-            <a:r>
-              <a:rPr lang="fr-FR" baseline="0" dirty="0" err="1" smtClean="0"/>
-              <a:t>built</a:t>
-            </a:r>
+              <a:t>Expliquer l’animation.</a:t>
+            </a:r>
+          </a:p>
+          <a:p>
+            <a:endParaRPr lang="fr-FR" baseline="0" dirty="0" smtClean="0"/>
+          </a:p>
+          <a:p>
             <a:r>
               <a:rPr lang="fr-FR" baseline="0" dirty="0" smtClean="0"/>
-              <a:t>-in types dans </a:t>
-            </a:r>
-          </a:p>
-          <a:p>
-            <a:r>
-              <a:rPr lang="fr-FR" dirty="0" smtClean="0"/>
-              <a:t>https://docs.python.org/2/library/stdtypes.html</a:t>
+              <a:t>À la fin noter le typage dynamique, l’objet à un type, la variable donne juste un lien vers un objet. </a:t>
             </a:r>
             <a:endParaRPr lang="fr-FR" dirty="0"/>
           </a:p>
@@ -1193,7 +1192,134 @@
               <a:pPr>
                 <a:defRPr/>
               </a:pPr>
-              <a:t>3</a:t>
+              <a:t>4</a:t>
+            </a:fld>
+            <a:endParaRPr lang="en-US"/>
+          </a:p>
+        </p:txBody>
+      </p:sp>
+    </p:spTree>
+    <p:extLst>
+      <p:ext uri="{BB962C8B-B14F-4D97-AF65-F5344CB8AC3E}">
+        <p14:creationId xmlns:p14="http://schemas.microsoft.com/office/powerpoint/2010/main" val="3493514724"/>
+      </p:ext>
+    </p:extLst>
+  </p:cSld>
+  <p:clrMapOvr>
+    <a:masterClrMapping/>
+  </p:clrMapOvr>
+</p:notes>
+</file>
+
+<file path=ppt/notesSlides/notesSlide4.xml><?xml version="1.0" encoding="utf-8"?>
+<p:notes xmlns:a="http://schemas.openxmlformats.org/drawingml/2006/main" xmlns:r="http://schemas.openxmlformats.org/officeDocument/2006/relationships" xmlns:p="http://schemas.openxmlformats.org/presentationml/2006/main">
+  <p:cSld>
+    <p:spTree>
+      <p:nvGrpSpPr>
+        <p:cNvPr id="1" name=""/>
+        <p:cNvGrpSpPr/>
+        <p:nvPr/>
+      </p:nvGrpSpPr>
+      <p:grpSpPr>
+        <a:xfrm>
+          <a:off x="0" y="0"/>
+          <a:ext cx="0" cy="0"/>
+          <a:chOff x="0" y="0"/>
+          <a:chExt cx="0" cy="0"/>
+        </a:xfrm>
+      </p:grpSpPr>
+      <p:sp>
+        <p:nvSpPr>
+          <p:cNvPr id="2" name="Espace réservé de l'image des diapositives 1"/>
+          <p:cNvSpPr>
+            <a:spLocks noGrp="1" noRot="1" noChangeAspect="1"/>
+          </p:cNvSpPr>
+          <p:nvPr>
+            <p:ph type="sldImg"/>
+          </p:nvPr>
+        </p:nvSpPr>
+        <p:spPr/>
+      </p:sp>
+      <p:sp>
+        <p:nvSpPr>
+          <p:cNvPr id="3" name="Espace réservé des commentaires 2"/>
+          <p:cNvSpPr>
+            <a:spLocks noGrp="1"/>
+          </p:cNvSpPr>
+          <p:nvPr>
+            <p:ph type="body" idx="1"/>
+          </p:nvPr>
+        </p:nvSpPr>
+        <p:spPr/>
+        <p:txBody>
+          <a:bodyPr/>
+          <a:lstStyle/>
+          <a:p>
+            <a:r>
+              <a:rPr lang="fr-FR" dirty="0" smtClean="0"/>
+              <a:t>Immutable est un néologisme</a:t>
+            </a:r>
+            <a:r>
+              <a:rPr lang="fr-FR" baseline="0" dirty="0" smtClean="0"/>
+              <a:t> (immuable en français), mais il permet </a:t>
+            </a:r>
+          </a:p>
+          <a:p>
+            <a:r>
+              <a:rPr lang="fr-FR" baseline="0" dirty="0" smtClean="0"/>
+              <a:t>Un meilleur parallèle avec la doc anglaise. </a:t>
+            </a:r>
+          </a:p>
+          <a:p>
+            <a:endParaRPr lang="fr-FR" baseline="0" dirty="0" smtClean="0"/>
+          </a:p>
+          <a:p>
+            <a:r>
+              <a:rPr lang="fr-FR" baseline="0" dirty="0" smtClean="0"/>
+              <a:t>Documentation sur tous les </a:t>
+            </a:r>
+            <a:r>
+              <a:rPr lang="fr-FR" baseline="0" dirty="0" err="1" smtClean="0"/>
+              <a:t>built</a:t>
+            </a:r>
+            <a:r>
+              <a:rPr lang="fr-FR" baseline="0" dirty="0" smtClean="0"/>
+              <a:t>-in types dans </a:t>
+            </a:r>
+          </a:p>
+          <a:p>
+            <a:r>
+              <a:rPr lang="fr-FR" dirty="0" smtClean="0"/>
+              <a:t>https://docs.python.org/2/library/stdtypes.html</a:t>
+            </a:r>
+            <a:endParaRPr lang="fr-FR" dirty="0"/>
+          </a:p>
+        </p:txBody>
+      </p:sp>
+      <p:sp>
+        <p:nvSpPr>
+          <p:cNvPr id="4" name="Espace réservé du numéro de diapositive 3"/>
+          <p:cNvSpPr>
+            <a:spLocks noGrp="1"/>
+          </p:cNvSpPr>
+          <p:nvPr>
+            <p:ph type="sldNum" sz="quarter" idx="10"/>
+          </p:nvPr>
+        </p:nvSpPr>
+        <p:spPr/>
+        <p:txBody>
+          <a:bodyPr/>
+          <a:lstStyle/>
+          <a:p>
+            <a:pPr>
+              <a:defRPr/>
+            </a:pPr>
+            <a:fld id="{9E8EB9F5-F2F7-4A48-A943-9B409357C15C}" type="slidenum">
+              <a:rPr lang="en-US" smtClean="0"/>
+              <a:pPr>
+                <a:defRPr/>
+              </a:pPr>
+              <a:t>5</a:t>
             </a:fld>
             <a:endParaRPr lang="en-US"/>
           </a:p>
@@ -4718,7 +4844,7 @@
           <a:p>
             <a:r>
               <a:rPr lang="fr-FR" dirty="0" smtClean="0"/>
-              <a:t>À la fin de cette vidéo vous connaitrez tous les types numériques en python et saurez les manipuler</a:t>
+              <a:t>À la fin de cette vidéo vous connaitrez la notion de typage dynamique et vous  connaitrez tous les types numériques en python et saurez les manipuler</a:t>
             </a:r>
           </a:p>
           <a:p>
@@ -4793,6 +4919,922 @@
 </file>
 
 <file path=ppt/slides/slide3.xml><?xml version="1.0" encoding="utf-8"?>
+<p:sld xmlns:a="http://schemas.openxmlformats.org/drawingml/2006/main" xmlns:r="http://schemas.openxmlformats.org/officeDocument/2006/relationships" xmlns:p="http://schemas.openxmlformats.org/presentationml/2006/main">
+  <p:cSld>
+    <p:spTree>
+      <p:nvGrpSpPr>
+        <p:cNvPr id="1" name=""/>
+        <p:cNvGrpSpPr/>
+        <p:nvPr/>
+      </p:nvGrpSpPr>
+      <p:grpSpPr>
+        <a:xfrm>
+          <a:off x="0" y="0"/>
+          <a:ext cx="0" cy="0"/>
+          <a:chOff x="0" y="0"/>
+          <a:chExt cx="0" cy="0"/>
+        </a:xfrm>
+      </p:grpSpPr>
+      <p:sp>
+        <p:nvSpPr>
+          <p:cNvPr id="2" name="Titre 1"/>
+          <p:cNvSpPr>
+            <a:spLocks noGrp="1"/>
+          </p:cNvSpPr>
+          <p:nvPr>
+            <p:ph type="title"/>
+          </p:nvPr>
+        </p:nvSpPr>
+        <p:spPr/>
+        <p:txBody>
+          <a:bodyPr/>
+          <a:lstStyle/>
+          <a:p>
+            <a:r>
+              <a:rPr lang="fr-FR" dirty="0" smtClean="0"/>
+              <a:t>Nouvelle séquence</a:t>
+            </a:r>
+            <a:endParaRPr lang="fr-FR" dirty="0"/>
+          </a:p>
+        </p:txBody>
+      </p:sp>
+      <p:sp>
+        <p:nvSpPr>
+          <p:cNvPr id="3" name="Espace réservé du contenu 2"/>
+          <p:cNvSpPr>
+            <a:spLocks noGrp="1"/>
+          </p:cNvSpPr>
+          <p:nvPr>
+            <p:ph idx="1"/>
+          </p:nvPr>
+        </p:nvSpPr>
+        <p:spPr/>
+        <p:txBody>
+          <a:bodyPr/>
+          <a:lstStyle/>
+          <a:p>
+            <a:endParaRPr lang="fr-FR"/>
+          </a:p>
+        </p:txBody>
+      </p:sp>
+    </p:spTree>
+    <p:extLst>
+      <p:ext uri="{BB962C8B-B14F-4D97-AF65-F5344CB8AC3E}">
+        <p14:creationId xmlns:p14="http://schemas.microsoft.com/office/powerpoint/2010/main" val="3107198915"/>
+      </p:ext>
+    </p:extLst>
+  </p:cSld>
+  <p:clrMapOvr>
+    <a:masterClrMapping/>
+  </p:clrMapOvr>
+  <p:timing>
+    <p:tnLst>
+      <p:par>
+        <p:cTn id="1" dur="indefinite" restart="never" nodeType="tmRoot"/>
+      </p:par>
+    </p:tnLst>
+  </p:timing>
+</p:sld>
+</file>
+
+<file path=ppt/slides/slide4.xml><?xml version="1.0" encoding="utf-8"?>
+<p:sld xmlns:a="http://schemas.openxmlformats.org/drawingml/2006/main" xmlns:r="http://schemas.openxmlformats.org/officeDocument/2006/relationships" xmlns:p="http://schemas.openxmlformats.org/presentationml/2006/main">
+  <p:cSld>
+    <p:spTree>
+      <p:nvGrpSpPr>
+        <p:cNvPr id="1" name=""/>
+        <p:cNvGrpSpPr/>
+        <p:nvPr/>
+      </p:nvGrpSpPr>
+      <p:grpSpPr>
+        <a:xfrm>
+          <a:off x="0" y="0"/>
+          <a:ext cx="0" cy="0"/>
+          <a:chOff x="0" y="0"/>
+          <a:chExt cx="0" cy="0"/>
+        </a:xfrm>
+      </p:grpSpPr>
+      <p:sp>
+        <p:nvSpPr>
+          <p:cNvPr id="4" name="Rectangle 3"/>
+          <p:cNvSpPr/>
+          <p:nvPr/>
+        </p:nvSpPr>
+        <p:spPr bwMode="auto">
+          <a:xfrm>
+            <a:off x="4622800" y="2036617"/>
+            <a:ext cx="4064000" cy="4525963"/>
+          </a:xfrm>
+          <a:prstGeom prst="rect">
+            <a:avLst/>
+          </a:prstGeom>
+          <a:noFill/>
+          <a:ln w="38100" cap="flat" cmpd="sng" algn="ctr">
+            <a:solidFill>
+              <a:srgbClr val="FF0000"/>
+            </a:solidFill>
+            <a:prstDash val="solid"/>
+            <a:round/>
+            <a:headEnd type="none" w="med" len="med"/>
+            <a:tailEnd type="none" w="med" len="med"/>
+          </a:ln>
+          <a:effectLst/>
+        </p:spPr>
+        <p:txBody>
+          <a:bodyPr vert="horz" wrap="none" lIns="90000" tIns="46800" rIns="90000" bIns="46800" numCol="1" rtlCol="0" anchor="ctr" anchorCtr="0" compatLnSpc="1">
+            <a:prstTxWarp prst="textNoShape">
+              <a:avLst/>
+            </a:prstTxWarp>
+            <a:spAutoFit/>
+          </a:bodyPr>
+          <a:lstStyle/>
+          <a:p>
+            <a:pPr marL="0" marR="0" indent="0" algn="ctr" defTabSz="914400" rtl="0" eaLnBrk="1" fontAlgn="base" latinLnBrk="0" hangingPunct="1">
+              <a:lnSpc>
+                <a:spcPct val="100000"/>
+              </a:lnSpc>
+              <a:spcBef>
+                <a:spcPct val="50000"/>
+              </a:spcBef>
+              <a:spcAft>
+                <a:spcPct val="0"/>
+              </a:spcAft>
+              <a:buClrTx/>
+              <a:buSzTx/>
+              <a:buFontTx/>
+              <a:buNone/>
+              <a:tabLst/>
+            </a:pPr>
+            <a:endParaRPr kumimoji="0" lang="fr-FR" sz="2400" b="0" i="0" u="none" strike="noStrike" cap="none" normalizeH="0" baseline="0" smtClean="0">
+              <a:ln>
+                <a:noFill/>
+              </a:ln>
+              <a:solidFill>
+                <a:schemeClr val="tx1"/>
+              </a:solidFill>
+              <a:effectLst/>
+              <a:latin typeface="Comic Sans MS" pitchFamily="66" charset="0"/>
+            </a:endParaRPr>
+          </a:p>
+        </p:txBody>
+      </p:sp>
+      <p:sp>
+        <p:nvSpPr>
+          <p:cNvPr id="6" name="ZoneTexte 5"/>
+          <p:cNvSpPr txBox="1"/>
+          <p:nvPr/>
+        </p:nvSpPr>
+        <p:spPr>
+          <a:xfrm>
+            <a:off x="5493327" y="1113287"/>
+            <a:ext cx="3454400" cy="923330"/>
+          </a:xfrm>
+          <a:prstGeom prst="rect">
+            <a:avLst/>
+          </a:prstGeom>
+          <a:noFill/>
+        </p:spPr>
+        <p:txBody>
+          <a:bodyPr wrap="square" rtlCol="0">
+            <a:spAutoFit/>
+          </a:bodyPr>
+          <a:lstStyle/>
+          <a:p>
+            <a:r>
+              <a:rPr lang="fr-FR" sz="5400" dirty="0" smtClean="0">
+                <a:latin typeface="Calibri" panose="020F0502020204030204" pitchFamily="34" charset="0"/>
+              </a:rPr>
+              <a:t>objets</a:t>
+            </a:r>
+            <a:endParaRPr lang="fr-FR" sz="5400" dirty="0">
+              <a:latin typeface="Calibri" panose="020F0502020204030204" pitchFamily="34" charset="0"/>
+            </a:endParaRPr>
+          </a:p>
+        </p:txBody>
+      </p:sp>
+      <p:sp>
+        <p:nvSpPr>
+          <p:cNvPr id="5" name="Rectangle 4"/>
+          <p:cNvSpPr/>
+          <p:nvPr/>
+        </p:nvSpPr>
+        <p:spPr bwMode="auto">
+          <a:xfrm>
+            <a:off x="457200" y="2036618"/>
+            <a:ext cx="4064000" cy="4525963"/>
+          </a:xfrm>
+          <a:prstGeom prst="rect">
+            <a:avLst/>
+          </a:prstGeom>
+          <a:noFill/>
+          <a:ln w="38100" cap="flat" cmpd="sng" algn="ctr">
+            <a:solidFill>
+              <a:srgbClr val="FF0000"/>
+            </a:solidFill>
+            <a:prstDash val="solid"/>
+            <a:round/>
+            <a:headEnd type="none" w="med" len="med"/>
+            <a:tailEnd type="none" w="med" len="med"/>
+          </a:ln>
+          <a:effectLst/>
+        </p:spPr>
+        <p:txBody>
+          <a:bodyPr vert="horz" wrap="none" lIns="90000" tIns="46800" rIns="90000" bIns="46800" numCol="1" rtlCol="0" anchor="ctr" anchorCtr="0" compatLnSpc="1">
+            <a:prstTxWarp prst="textNoShape">
+              <a:avLst/>
+            </a:prstTxWarp>
+            <a:spAutoFit/>
+          </a:bodyPr>
+          <a:lstStyle/>
+          <a:p>
+            <a:pPr marL="0" marR="0" indent="0" algn="ctr" defTabSz="914400" rtl="0" eaLnBrk="1" fontAlgn="base" latinLnBrk="0" hangingPunct="1">
+              <a:lnSpc>
+                <a:spcPct val="100000"/>
+              </a:lnSpc>
+              <a:spcBef>
+                <a:spcPct val="50000"/>
+              </a:spcBef>
+              <a:spcAft>
+                <a:spcPct val="0"/>
+              </a:spcAft>
+              <a:buClrTx/>
+              <a:buSzTx/>
+              <a:buFontTx/>
+              <a:buNone/>
+              <a:tabLst/>
+            </a:pPr>
+            <a:endParaRPr kumimoji="0" lang="fr-FR" sz="2400" b="0" i="0" u="none" strike="noStrike" cap="none" normalizeH="0" baseline="0" smtClean="0">
+              <a:ln>
+                <a:noFill/>
+              </a:ln>
+              <a:solidFill>
+                <a:schemeClr val="tx1"/>
+              </a:solidFill>
+              <a:effectLst/>
+              <a:latin typeface="Comic Sans MS" pitchFamily="66" charset="0"/>
+            </a:endParaRPr>
+          </a:p>
+        </p:txBody>
+      </p:sp>
+      <p:sp>
+        <p:nvSpPr>
+          <p:cNvPr id="7" name="ZoneTexte 6"/>
+          <p:cNvSpPr txBox="1"/>
+          <p:nvPr/>
+        </p:nvSpPr>
+        <p:spPr>
+          <a:xfrm>
+            <a:off x="1248064" y="1113287"/>
+            <a:ext cx="3454400" cy="923330"/>
+          </a:xfrm>
+          <a:prstGeom prst="rect">
+            <a:avLst/>
+          </a:prstGeom>
+          <a:noFill/>
+        </p:spPr>
+        <p:txBody>
+          <a:bodyPr wrap="square" rtlCol="0">
+            <a:spAutoFit/>
+          </a:bodyPr>
+          <a:lstStyle/>
+          <a:p>
+            <a:r>
+              <a:rPr lang="fr-FR" sz="5400" dirty="0" smtClean="0">
+                <a:latin typeface="Calibri" panose="020F0502020204030204" pitchFamily="34" charset="0"/>
+              </a:rPr>
+              <a:t>variables</a:t>
+            </a:r>
+            <a:endParaRPr lang="fr-FR" sz="5400" dirty="0">
+              <a:latin typeface="Calibri" panose="020F0502020204030204" pitchFamily="34" charset="0"/>
+            </a:endParaRPr>
+          </a:p>
+        </p:txBody>
+      </p:sp>
+      <p:sp>
+        <p:nvSpPr>
+          <p:cNvPr id="2" name="ZoneTexte 1"/>
+          <p:cNvSpPr txBox="1"/>
+          <p:nvPr/>
+        </p:nvSpPr>
+        <p:spPr>
+          <a:xfrm>
+            <a:off x="457200" y="322926"/>
+            <a:ext cx="6669809" cy="707886"/>
+          </a:xfrm>
+          <a:prstGeom prst="rect">
+            <a:avLst/>
+          </a:prstGeom>
+          <a:noFill/>
+        </p:spPr>
+        <p:txBody>
+          <a:bodyPr wrap="square" rtlCol="0">
+            <a:spAutoFit/>
+          </a:bodyPr>
+          <a:lstStyle/>
+          <a:p>
+            <a:r>
+              <a:rPr lang="fr-FR" sz="4000" dirty="0" smtClean="0">
+                <a:latin typeface="Courier New" panose="02070309020205020404" pitchFamily="49" charset="0"/>
+                <a:cs typeface="Courier New" panose="02070309020205020404" pitchFamily="49" charset="0"/>
+              </a:rPr>
+              <a:t>&gt;&gt;&gt; a = 3</a:t>
+            </a:r>
+            <a:endParaRPr lang="fr-FR" sz="4000" dirty="0">
+              <a:latin typeface="Courier New" panose="02070309020205020404" pitchFamily="49" charset="0"/>
+              <a:cs typeface="Courier New" panose="02070309020205020404" pitchFamily="49" charset="0"/>
+            </a:endParaRPr>
+          </a:p>
+        </p:txBody>
+      </p:sp>
+      <p:sp>
+        <p:nvSpPr>
+          <p:cNvPr id="8" name="ZoneTexte 7"/>
+          <p:cNvSpPr txBox="1"/>
+          <p:nvPr/>
+        </p:nvSpPr>
+        <p:spPr>
+          <a:xfrm>
+            <a:off x="6005945" y="3595255"/>
+            <a:ext cx="644237" cy="923330"/>
+          </a:xfrm>
+          <a:prstGeom prst="rect">
+            <a:avLst/>
+          </a:prstGeom>
+          <a:noFill/>
+          <a:ln w="38100">
+            <a:solidFill>
+              <a:schemeClr val="tx1"/>
+            </a:solidFill>
+          </a:ln>
+        </p:spPr>
+        <p:txBody>
+          <a:bodyPr wrap="square" rtlCol="0">
+            <a:spAutoFit/>
+          </a:bodyPr>
+          <a:lstStyle/>
+          <a:p>
+            <a:pPr algn="ctr"/>
+            <a:r>
+              <a:rPr lang="fr-FR" sz="5400" dirty="0" smtClean="0">
+                <a:latin typeface="Calibri" panose="020F0502020204030204" pitchFamily="34" charset="0"/>
+              </a:rPr>
+              <a:t>3</a:t>
+            </a:r>
+            <a:endParaRPr lang="fr-FR" sz="5400" dirty="0">
+              <a:latin typeface="Calibri" panose="020F0502020204030204" pitchFamily="34" charset="0"/>
+            </a:endParaRPr>
+          </a:p>
+        </p:txBody>
+      </p:sp>
+      <p:sp>
+        <p:nvSpPr>
+          <p:cNvPr id="9" name="ZoneTexte 8"/>
+          <p:cNvSpPr txBox="1"/>
+          <p:nvPr/>
+        </p:nvSpPr>
+        <p:spPr>
+          <a:xfrm>
+            <a:off x="1854778" y="3595255"/>
+            <a:ext cx="1080654" cy="923330"/>
+          </a:xfrm>
+          <a:prstGeom prst="rect">
+            <a:avLst/>
+          </a:prstGeom>
+          <a:noFill/>
+        </p:spPr>
+        <p:txBody>
+          <a:bodyPr wrap="square" rtlCol="0">
+            <a:spAutoFit/>
+          </a:bodyPr>
+          <a:lstStyle/>
+          <a:p>
+            <a:r>
+              <a:rPr lang="fr-FR" sz="5400" dirty="0">
+                <a:latin typeface="Calibri" panose="020F0502020204030204" pitchFamily="34" charset="0"/>
+              </a:rPr>
+              <a:t>a</a:t>
+            </a:r>
+            <a:endParaRPr lang="fr-FR" sz="5400" dirty="0" smtClean="0">
+              <a:latin typeface="Calibri" panose="020F0502020204030204" pitchFamily="34" charset="0"/>
+            </a:endParaRPr>
+          </a:p>
+        </p:txBody>
+      </p:sp>
+      <p:sp>
+        <p:nvSpPr>
+          <p:cNvPr id="12" name="Forme libre 11"/>
+          <p:cNvSpPr/>
+          <p:nvPr/>
+        </p:nvSpPr>
+        <p:spPr bwMode="auto">
+          <a:xfrm>
+            <a:off x="2348346" y="3075378"/>
+            <a:ext cx="3595254" cy="1101768"/>
+          </a:xfrm>
+          <a:custGeom>
+            <a:avLst/>
+            <a:gdLst>
+              <a:gd name="connsiteX0" fmla="*/ 0 w 3366654"/>
+              <a:gd name="connsiteY0" fmla="*/ 1144751 h 1144751"/>
+              <a:gd name="connsiteX1" fmla="*/ 1371600 w 3366654"/>
+              <a:gd name="connsiteY1" fmla="*/ 1751 h 1144751"/>
+              <a:gd name="connsiteX2" fmla="*/ 3366654 w 3366654"/>
+              <a:gd name="connsiteY2" fmla="*/ 936933 h 1144751"/>
+              <a:gd name="connsiteX0" fmla="*/ 0 w 3366654"/>
+              <a:gd name="connsiteY0" fmla="*/ 1103340 h 1103340"/>
+              <a:gd name="connsiteX1" fmla="*/ 1799729 w 3366654"/>
+              <a:gd name="connsiteY1" fmla="*/ 1904 h 1103340"/>
+              <a:gd name="connsiteX2" fmla="*/ 3366654 w 3366654"/>
+              <a:gd name="connsiteY2" fmla="*/ 895522 h 1103340"/>
+              <a:gd name="connsiteX0" fmla="*/ 0 w 3366654"/>
+              <a:gd name="connsiteY0" fmla="*/ 1103340 h 1103340"/>
+              <a:gd name="connsiteX1" fmla="*/ 1799729 w 3366654"/>
+              <a:gd name="connsiteY1" fmla="*/ 1904 h 1103340"/>
+              <a:gd name="connsiteX2" fmla="*/ 3366654 w 3366654"/>
+              <a:gd name="connsiteY2" fmla="*/ 895522 h 1103340"/>
+              <a:gd name="connsiteX0" fmla="*/ 0 w 3366654"/>
+              <a:gd name="connsiteY0" fmla="*/ 1101768 h 1101768"/>
+              <a:gd name="connsiteX1" fmla="*/ 1799729 w 3366654"/>
+              <a:gd name="connsiteY1" fmla="*/ 332 h 1101768"/>
+              <a:gd name="connsiteX2" fmla="*/ 3366654 w 3366654"/>
+              <a:gd name="connsiteY2" fmla="*/ 893950 h 1101768"/>
+            </a:gdLst>
+            <a:ahLst/>
+            <a:cxnLst>
+              <a:cxn ang="0">
+                <a:pos x="connsiteX0" y="connsiteY0"/>
+              </a:cxn>
+              <a:cxn ang="0">
+                <a:pos x="connsiteX1" y="connsiteY1"/>
+              </a:cxn>
+              <a:cxn ang="0">
+                <a:pos x="connsiteX2" y="connsiteY2"/>
+              </a:cxn>
+            </a:cxnLst>
+            <a:rect l="l" t="t" r="r" b="b"/>
+            <a:pathLst>
+              <a:path w="3366654" h="1101768">
+                <a:moveTo>
+                  <a:pt x="0" y="1101768"/>
+                </a:moveTo>
+                <a:cubicBezTo>
+                  <a:pt x="405245" y="547586"/>
+                  <a:pt x="1160778" y="14186"/>
+                  <a:pt x="1799729" y="332"/>
+                </a:cubicBezTo>
+                <a:cubicBezTo>
+                  <a:pt x="2438680" y="-13522"/>
+                  <a:pt x="2649681" y="409041"/>
+                  <a:pt x="3366654" y="893950"/>
+                </a:cubicBezTo>
+              </a:path>
+            </a:pathLst>
+          </a:custGeom>
+          <a:noFill/>
+          <a:ln w="38100" cap="flat" cmpd="sng" algn="ctr">
+            <a:solidFill>
+              <a:schemeClr val="tx1"/>
+            </a:solidFill>
+            <a:prstDash val="solid"/>
+            <a:round/>
+            <a:headEnd type="none" w="med" len="med"/>
+            <a:tailEnd type="triangle" w="lg" len="lg"/>
+          </a:ln>
+          <a:effectLst/>
+        </p:spPr>
+        <p:txBody>
+          <a:bodyPr rtlCol="0" anchor="ctr"/>
+          <a:lstStyle/>
+          <a:p>
+            <a:pPr algn="ctr"/>
+            <a:endParaRPr lang="fr-FR"/>
+          </a:p>
+        </p:txBody>
+      </p:sp>
+    </p:spTree>
+    <p:extLst>
+      <p:ext uri="{BB962C8B-B14F-4D97-AF65-F5344CB8AC3E}">
+        <p14:creationId xmlns:p14="http://schemas.microsoft.com/office/powerpoint/2010/main" val="1220478283"/>
+      </p:ext>
+    </p:extLst>
+  </p:cSld>
+  <p:clrMapOvr>
+    <a:masterClrMapping/>
+  </p:clrMapOvr>
+  <p:timing>
+    <p:tnLst>
+      <p:par>
+        <p:cTn id="1" dur="indefinite" restart="never" nodeType="tmRoot">
+          <p:childTnLst>
+            <p:seq concurrent="1" nextAc="seek">
+              <p:cTn id="2" dur="indefinite" nodeType="mainSeq">
+                <p:childTnLst>
+                  <p:par>
+                    <p:cTn id="3" fill="hold">
+                      <p:stCondLst>
+                        <p:cond delay="indefinite"/>
+                      </p:stCondLst>
+                      <p:childTnLst>
+                        <p:par>
+                          <p:cTn id="4" fill="hold">
+                            <p:stCondLst>
+                              <p:cond delay="0"/>
+                            </p:stCondLst>
+                            <p:childTnLst>
+                              <p:par>
+                                <p:cTn id="5" presetID="10" presetClass="entr" presetSubtype="0" fill="hold" grpId="0" nodeType="clickEffect">
+                                  <p:stCondLst>
+                                    <p:cond delay="0"/>
+                                  </p:stCondLst>
+                                  <p:childTnLst>
+                                    <p:set>
+                                      <p:cBhvr>
+                                        <p:cTn id="6" dur="1" fill="hold">
+                                          <p:stCondLst>
+                                            <p:cond delay="0"/>
+                                          </p:stCondLst>
+                                        </p:cTn>
+                                        <p:tgtEl>
+                                          <p:spTgt spid="2"/>
+                                        </p:tgtEl>
+                                        <p:attrNameLst>
+                                          <p:attrName>style.visibility</p:attrName>
+                                        </p:attrNameLst>
+                                      </p:cBhvr>
+                                      <p:to>
+                                        <p:strVal val="visible"/>
+                                      </p:to>
+                                    </p:set>
+                                    <p:animEffect transition="in" filter="fade">
+                                      <p:cBhvr>
+                                        <p:cTn id="7" dur="500"/>
+                                        <p:tgtEl>
+                                          <p:spTgt spid="2"/>
+                                        </p:tgtEl>
+                                      </p:cBhvr>
+                                    </p:animEffect>
+                                  </p:childTnLst>
+                                </p:cTn>
+                              </p:par>
+                            </p:childTnLst>
+                          </p:cTn>
+                        </p:par>
+                      </p:childTnLst>
+                    </p:cTn>
+                  </p:par>
+                  <p:par>
+                    <p:cTn id="8" fill="hold">
+                      <p:stCondLst>
+                        <p:cond delay="indefinite"/>
+                      </p:stCondLst>
+                      <p:childTnLst>
+                        <p:par>
+                          <p:cTn id="9" fill="hold">
+                            <p:stCondLst>
+                              <p:cond delay="0"/>
+                            </p:stCondLst>
+                            <p:childTnLst>
+                              <p:par>
+                                <p:cTn id="10" presetID="10" presetClass="entr" presetSubtype="0" fill="hold" grpId="0" nodeType="clickEffect">
+                                  <p:stCondLst>
+                                    <p:cond delay="0"/>
+                                  </p:stCondLst>
+                                  <p:childTnLst>
+                                    <p:set>
+                                      <p:cBhvr>
+                                        <p:cTn id="11" dur="1" fill="hold">
+                                          <p:stCondLst>
+                                            <p:cond delay="0"/>
+                                          </p:stCondLst>
+                                        </p:cTn>
+                                        <p:tgtEl>
+                                          <p:spTgt spid="6"/>
+                                        </p:tgtEl>
+                                        <p:attrNameLst>
+                                          <p:attrName>style.visibility</p:attrName>
+                                        </p:attrNameLst>
+                                      </p:cBhvr>
+                                      <p:to>
+                                        <p:strVal val="visible"/>
+                                      </p:to>
+                                    </p:set>
+                                    <p:animEffect transition="in" filter="fade">
+                                      <p:cBhvr>
+                                        <p:cTn id="12" dur="500"/>
+                                        <p:tgtEl>
+                                          <p:spTgt spid="6"/>
+                                        </p:tgtEl>
+                                      </p:cBhvr>
+                                    </p:animEffect>
+                                  </p:childTnLst>
+                                </p:cTn>
+                              </p:par>
+                              <p:par>
+                                <p:cTn id="13" presetID="10" presetClass="entr" presetSubtype="0" fill="hold" grpId="0" nodeType="withEffect">
+                                  <p:stCondLst>
+                                    <p:cond delay="0"/>
+                                  </p:stCondLst>
+                                  <p:childTnLst>
+                                    <p:set>
+                                      <p:cBhvr>
+                                        <p:cTn id="14" dur="1" fill="hold">
+                                          <p:stCondLst>
+                                            <p:cond delay="0"/>
+                                          </p:stCondLst>
+                                        </p:cTn>
+                                        <p:tgtEl>
+                                          <p:spTgt spid="4"/>
+                                        </p:tgtEl>
+                                        <p:attrNameLst>
+                                          <p:attrName>style.visibility</p:attrName>
+                                        </p:attrNameLst>
+                                      </p:cBhvr>
+                                      <p:to>
+                                        <p:strVal val="visible"/>
+                                      </p:to>
+                                    </p:set>
+                                    <p:animEffect transition="in" filter="fade">
+                                      <p:cBhvr>
+                                        <p:cTn id="15" dur="500"/>
+                                        <p:tgtEl>
+                                          <p:spTgt spid="4"/>
+                                        </p:tgtEl>
+                                      </p:cBhvr>
+                                    </p:animEffect>
+                                  </p:childTnLst>
+                                </p:cTn>
+                              </p:par>
+                              <p:par>
+                                <p:cTn id="16" presetID="10" presetClass="entr" presetSubtype="0" fill="hold" grpId="0" nodeType="withEffect">
+                                  <p:stCondLst>
+                                    <p:cond delay="0"/>
+                                  </p:stCondLst>
+                                  <p:childTnLst>
+                                    <p:set>
+                                      <p:cBhvr>
+                                        <p:cTn id="17" dur="1" fill="hold">
+                                          <p:stCondLst>
+                                            <p:cond delay="0"/>
+                                          </p:stCondLst>
+                                        </p:cTn>
+                                        <p:tgtEl>
+                                          <p:spTgt spid="7"/>
+                                        </p:tgtEl>
+                                        <p:attrNameLst>
+                                          <p:attrName>style.visibility</p:attrName>
+                                        </p:attrNameLst>
+                                      </p:cBhvr>
+                                      <p:to>
+                                        <p:strVal val="visible"/>
+                                      </p:to>
+                                    </p:set>
+                                    <p:animEffect transition="in" filter="fade">
+                                      <p:cBhvr>
+                                        <p:cTn id="18" dur="500"/>
+                                        <p:tgtEl>
+                                          <p:spTgt spid="7"/>
+                                        </p:tgtEl>
+                                      </p:cBhvr>
+                                    </p:animEffect>
+                                  </p:childTnLst>
+                                </p:cTn>
+                              </p:par>
+                              <p:par>
+                                <p:cTn id="19" presetID="10" presetClass="entr" presetSubtype="0" fill="hold" grpId="0" nodeType="withEffect">
+                                  <p:stCondLst>
+                                    <p:cond delay="0"/>
+                                  </p:stCondLst>
+                                  <p:childTnLst>
+                                    <p:set>
+                                      <p:cBhvr>
+                                        <p:cTn id="20" dur="1" fill="hold">
+                                          <p:stCondLst>
+                                            <p:cond delay="0"/>
+                                          </p:stCondLst>
+                                        </p:cTn>
+                                        <p:tgtEl>
+                                          <p:spTgt spid="5"/>
+                                        </p:tgtEl>
+                                        <p:attrNameLst>
+                                          <p:attrName>style.visibility</p:attrName>
+                                        </p:attrNameLst>
+                                      </p:cBhvr>
+                                      <p:to>
+                                        <p:strVal val="visible"/>
+                                      </p:to>
+                                    </p:set>
+                                    <p:animEffect transition="in" filter="fade">
+                                      <p:cBhvr>
+                                        <p:cTn id="21" dur="500"/>
+                                        <p:tgtEl>
+                                          <p:spTgt spid="5"/>
+                                        </p:tgtEl>
+                                      </p:cBhvr>
+                                    </p:animEffect>
+                                  </p:childTnLst>
+                                </p:cTn>
+                              </p:par>
+                            </p:childTnLst>
+                          </p:cTn>
+                        </p:par>
+                      </p:childTnLst>
+                    </p:cTn>
+                  </p:par>
+                  <p:par>
+                    <p:cTn id="22" fill="hold">
+                      <p:stCondLst>
+                        <p:cond delay="indefinite"/>
+                      </p:stCondLst>
+                      <p:childTnLst>
+                        <p:par>
+                          <p:cTn id="23" fill="hold">
+                            <p:stCondLst>
+                              <p:cond delay="0"/>
+                            </p:stCondLst>
+                            <p:childTnLst>
+                              <p:par>
+                                <p:cTn id="24" presetID="10" presetClass="entr" presetSubtype="0" fill="hold" grpId="0" nodeType="clickEffect">
+                                  <p:stCondLst>
+                                    <p:cond delay="0"/>
+                                  </p:stCondLst>
+                                  <p:childTnLst>
+                                    <p:set>
+                                      <p:cBhvr>
+                                        <p:cTn id="25" dur="1" fill="hold">
+                                          <p:stCondLst>
+                                            <p:cond delay="0"/>
+                                          </p:stCondLst>
+                                        </p:cTn>
+                                        <p:tgtEl>
+                                          <p:spTgt spid="8"/>
+                                        </p:tgtEl>
+                                        <p:attrNameLst>
+                                          <p:attrName>style.visibility</p:attrName>
+                                        </p:attrNameLst>
+                                      </p:cBhvr>
+                                      <p:to>
+                                        <p:strVal val="visible"/>
+                                      </p:to>
+                                    </p:set>
+                                    <p:animEffect transition="in" filter="fade">
+                                      <p:cBhvr>
+                                        <p:cTn id="26" dur="500"/>
+                                        <p:tgtEl>
+                                          <p:spTgt spid="8"/>
+                                        </p:tgtEl>
+                                      </p:cBhvr>
+                                    </p:animEffect>
+                                  </p:childTnLst>
+                                </p:cTn>
+                              </p:par>
+                            </p:childTnLst>
+                          </p:cTn>
+                        </p:par>
+                      </p:childTnLst>
+                    </p:cTn>
+                  </p:par>
+                  <p:par>
+                    <p:cTn id="27" fill="hold">
+                      <p:stCondLst>
+                        <p:cond delay="indefinite"/>
+                      </p:stCondLst>
+                      <p:childTnLst>
+                        <p:par>
+                          <p:cTn id="28" fill="hold">
+                            <p:stCondLst>
+                              <p:cond delay="0"/>
+                            </p:stCondLst>
+                            <p:childTnLst>
+                              <p:par>
+                                <p:cTn id="29" presetID="10" presetClass="entr" presetSubtype="0" fill="hold" grpId="0" nodeType="clickEffect">
+                                  <p:stCondLst>
+                                    <p:cond delay="0"/>
+                                  </p:stCondLst>
+                                  <p:childTnLst>
+                                    <p:set>
+                                      <p:cBhvr>
+                                        <p:cTn id="30" dur="1" fill="hold">
+                                          <p:stCondLst>
+                                            <p:cond delay="0"/>
+                                          </p:stCondLst>
+                                        </p:cTn>
+                                        <p:tgtEl>
+                                          <p:spTgt spid="9"/>
+                                        </p:tgtEl>
+                                        <p:attrNameLst>
+                                          <p:attrName>style.visibility</p:attrName>
+                                        </p:attrNameLst>
+                                      </p:cBhvr>
+                                      <p:to>
+                                        <p:strVal val="visible"/>
+                                      </p:to>
+                                    </p:set>
+                                    <p:animEffect transition="in" filter="fade">
+                                      <p:cBhvr>
+                                        <p:cTn id="31" dur="500"/>
+                                        <p:tgtEl>
+                                          <p:spTgt spid="9"/>
+                                        </p:tgtEl>
+                                      </p:cBhvr>
+                                    </p:animEffect>
+                                  </p:childTnLst>
+                                </p:cTn>
+                              </p:par>
+                            </p:childTnLst>
+                          </p:cTn>
+                        </p:par>
+                      </p:childTnLst>
+                    </p:cTn>
+                  </p:par>
+                  <p:par>
+                    <p:cTn id="32" fill="hold">
+                      <p:stCondLst>
+                        <p:cond delay="indefinite"/>
+                      </p:stCondLst>
+                      <p:childTnLst>
+                        <p:par>
+                          <p:cTn id="33" fill="hold">
+                            <p:stCondLst>
+                              <p:cond delay="0"/>
+                            </p:stCondLst>
+                            <p:childTnLst>
+                              <p:par>
+                                <p:cTn id="34" presetID="10" presetClass="entr" presetSubtype="0" fill="hold" grpId="0" nodeType="clickEffect">
+                                  <p:stCondLst>
+                                    <p:cond delay="0"/>
+                                  </p:stCondLst>
+                                  <p:childTnLst>
+                                    <p:set>
+                                      <p:cBhvr>
+                                        <p:cTn id="35" dur="1" fill="hold">
+                                          <p:stCondLst>
+                                            <p:cond delay="0"/>
+                                          </p:stCondLst>
+                                        </p:cTn>
+                                        <p:tgtEl>
+                                          <p:spTgt spid="12"/>
+                                        </p:tgtEl>
+                                        <p:attrNameLst>
+                                          <p:attrName>style.visibility</p:attrName>
+                                        </p:attrNameLst>
+                                      </p:cBhvr>
+                                      <p:to>
+                                        <p:strVal val="visible"/>
+                                      </p:to>
+                                    </p:set>
+                                    <p:animEffect transition="in" filter="fade">
+                                      <p:cBhvr>
+                                        <p:cTn id="36" dur="500"/>
+                                        <p:tgtEl>
+                                          <p:spTgt spid="12"/>
+                                        </p:tgtEl>
+                                      </p:cBhvr>
+                                    </p:animEffect>
+                                  </p:childTnLst>
+                                </p:cTn>
+                              </p:par>
+                            </p:childTnLst>
+                          </p:cTn>
+                        </p:par>
+                      </p:childTnLst>
+                    </p:cTn>
+                  </p:par>
+                </p:childTnLst>
+              </p:cTn>
+              <p:prevCondLst>
+                <p:cond evt="onPrev" delay="0">
+                  <p:tgtEl>
+                    <p:sldTgt/>
+                  </p:tgtEl>
+                </p:cond>
+              </p:prevCondLst>
+              <p:nextCondLst>
+                <p:cond evt="onNext" delay="0">
+                  <p:tgtEl>
+                    <p:sldTgt/>
+                  </p:tgtEl>
+                </p:cond>
+              </p:nextCondLst>
+            </p:seq>
+          </p:childTnLst>
+        </p:cTn>
+      </p:par>
+    </p:tnLst>
+    <p:bldLst>
+      <p:bldP spid="4" grpId="0" animBg="1"/>
+      <p:bldP spid="6" grpId="0"/>
+      <p:bldP spid="5" grpId="0" animBg="1"/>
+      <p:bldP spid="7" grpId="0"/>
+      <p:bldP spid="2" grpId="0"/>
+      <p:bldP spid="8" grpId="0" animBg="1"/>
+      <p:bldP spid="9" grpId="0"/>
+      <p:bldP spid="12" grpId="0" animBg="1"/>
+    </p:bldLst>
+  </p:timing>
+</p:sld>
+</file>
+
+<file path=ppt/slides/slide5.xml><?xml version="1.0" encoding="utf-8"?>
 <p:sld xmlns:a="http://schemas.openxmlformats.org/drawingml/2006/main" xmlns:r="http://schemas.openxmlformats.org/officeDocument/2006/relationships" xmlns:p="http://schemas.openxmlformats.org/presentationml/2006/main">
   <p:cSld>
     <p:spTree>

</xml_diff>

<commit_message>
added new files for week2
</commit_message>
<xml_diff>
--- a/semaine2/semaine2-1.pptx
+++ b/semaine2/semaine2-1.pptx
@@ -5,17 +5,18 @@
     <p:sldMasterId id="2147483649" r:id="rId1"/>
   </p:sldMasterIdLst>
   <p:notesMasterIdLst>
-    <p:notesMasterId r:id="rId7"/>
+    <p:notesMasterId r:id="rId8"/>
   </p:notesMasterIdLst>
   <p:handoutMasterIdLst>
-    <p:handoutMasterId r:id="rId8"/>
+    <p:handoutMasterId r:id="rId9"/>
   </p:handoutMasterIdLst>
   <p:sldIdLst>
     <p:sldId id="893" r:id="rId2"/>
     <p:sldId id="895" r:id="rId3"/>
     <p:sldId id="896" r:id="rId4"/>
-    <p:sldId id="897" r:id="rId5"/>
-    <p:sldId id="891" r:id="rId6"/>
+    <p:sldId id="898" r:id="rId5"/>
+    <p:sldId id="897" r:id="rId6"/>
+    <p:sldId id="891" r:id="rId7"/>
   </p:sldIdLst>
   <p:sldSz cx="9144000" cy="6858000" type="screen4x3"/>
   <p:notesSz cx="7099300" cy="10234613"/>
@@ -152,6 +153,7 @@
             <p14:sldId id="893"/>
             <p14:sldId id="895"/>
             <p14:sldId id="896"/>
+            <p14:sldId id="898"/>
             <p14:sldId id="897"/>
             <p14:sldId id="891"/>
           </p14:sldIdLst>
@@ -1192,7 +1194,7 @@
               <a:pPr>
                 <a:defRPr/>
               </a:pPr>
-              <a:t>4</a:t>
+              <a:t>5</a:t>
             </a:fld>
             <a:endParaRPr lang="en-US"/>
           </a:p>
@@ -1319,7 +1321,7 @@
               <a:pPr>
                 <a:defRPr/>
               </a:pPr>
-              <a:t>5</a:t>
+              <a:t>6</a:t>
             </a:fld>
             <a:endParaRPr lang="en-US"/>
           </a:p>
@@ -4998,6 +5000,166 @@
 </file>
 
 <file path=ppt/slides/slide4.xml><?xml version="1.0" encoding="utf-8"?>
+<p:sld xmlns:a="http://schemas.openxmlformats.org/drawingml/2006/main" xmlns:r="http://schemas.openxmlformats.org/officeDocument/2006/relationships" xmlns:p="http://schemas.openxmlformats.org/presentationml/2006/main">
+  <p:cSld>
+    <p:spTree>
+      <p:nvGrpSpPr>
+        <p:cNvPr id="1" name=""/>
+        <p:cNvGrpSpPr/>
+        <p:nvPr/>
+      </p:nvGrpSpPr>
+      <p:grpSpPr>
+        <a:xfrm>
+          <a:off x="0" y="0"/>
+          <a:ext cx="0" cy="0"/>
+          <a:chOff x="0" y="0"/>
+          <a:chExt cx="0" cy="0"/>
+        </a:xfrm>
+      </p:grpSpPr>
+      <p:sp>
+        <p:nvSpPr>
+          <p:cNvPr id="2" name="Titre 1"/>
+          <p:cNvSpPr>
+            <a:spLocks noGrp="1"/>
+          </p:cNvSpPr>
+          <p:nvPr>
+            <p:ph type="title"/>
+          </p:nvPr>
+        </p:nvSpPr>
+        <p:spPr/>
+        <p:txBody>
+          <a:bodyPr/>
+          <a:lstStyle/>
+          <a:p>
+            <a:r>
+              <a:rPr lang="fr-FR" dirty="0" smtClean="0"/>
+              <a:t>En Python, tout est un objet</a:t>
+            </a:r>
+            <a:endParaRPr lang="fr-FR" dirty="0"/>
+          </a:p>
+        </p:txBody>
+      </p:sp>
+      <p:sp>
+        <p:nvSpPr>
+          <p:cNvPr id="3" name="Espace réservé du contenu 2"/>
+          <p:cNvSpPr>
+            <a:spLocks noGrp="1"/>
+          </p:cNvSpPr>
+          <p:nvPr>
+            <p:ph idx="1"/>
+          </p:nvPr>
+        </p:nvSpPr>
+        <p:spPr/>
+        <p:txBody>
+          <a:bodyPr/>
+          <a:lstStyle/>
+          <a:p>
+            <a:r>
+              <a:rPr lang="fr-FR" dirty="0" smtClean="0"/>
+              <a:t>Grande uniformité qui simplifie et accélère le développement </a:t>
+            </a:r>
+          </a:p>
+          <a:p>
+            <a:r>
+              <a:rPr lang="fr-FR" dirty="0" smtClean="0"/>
+              <a:t>On accède à tous les objets par leur référence en mémoire</a:t>
+            </a:r>
+          </a:p>
+          <a:p>
+            <a:pPr lvl="1"/>
+            <a:r>
+              <a:rPr lang="fr-FR" dirty="0" smtClean="0"/>
+              <a:t>Mais on ne manipule jamais directement les références mémoires</a:t>
+            </a:r>
+          </a:p>
+          <a:p>
+            <a:pPr lvl="1"/>
+            <a:r>
+              <a:rPr lang="fr-FR" dirty="0" smtClean="0"/>
+              <a:t>On utilise en général l’affectation</a:t>
+            </a:r>
+          </a:p>
+          <a:p>
+            <a:endParaRPr lang="fr-FR" dirty="0"/>
+          </a:p>
+          <a:p>
+            <a:r>
+              <a:rPr lang="fr-FR" dirty="0" smtClean="0"/>
+              <a:t>Python est livré avec beaucoup d’objets de base, ce sont les types de base</a:t>
+            </a:r>
+          </a:p>
+          <a:p>
+            <a:pPr lvl="1"/>
+            <a:endParaRPr lang="fr-FR" dirty="0"/>
+          </a:p>
+        </p:txBody>
+      </p:sp>
+      <p:sp>
+        <p:nvSpPr>
+          <p:cNvPr id="4" name="ZoneTexte 3"/>
+          <p:cNvSpPr txBox="1"/>
+          <p:nvPr/>
+        </p:nvSpPr>
+        <p:spPr>
+          <a:xfrm>
+            <a:off x="0" y="92076"/>
+            <a:ext cx="1537855" cy="400110"/>
+          </a:xfrm>
+          <a:prstGeom prst="rect">
+            <a:avLst/>
+          </a:prstGeom>
+          <a:noFill/>
+          <a:ln>
+            <a:solidFill>
+              <a:srgbClr val="FF0000"/>
+            </a:solidFill>
+          </a:ln>
+        </p:spPr>
+        <p:txBody>
+          <a:bodyPr wrap="square" rtlCol="0">
+            <a:spAutoFit/>
+          </a:bodyPr>
+          <a:lstStyle/>
+          <a:p>
+            <a:r>
+              <a:rPr lang="fr-FR" sz="2000" dirty="0" smtClean="0">
+                <a:solidFill>
+                  <a:srgbClr val="FF0000"/>
+                </a:solidFill>
+                <a:latin typeface="Calibri" panose="020F0502020204030204" pitchFamily="34" charset="0"/>
+              </a:rPr>
+              <a:t>prompteur</a:t>
+            </a:r>
+            <a:endParaRPr lang="fr-FR" sz="2000" dirty="0">
+              <a:solidFill>
+                <a:srgbClr val="FF0000"/>
+              </a:solidFill>
+              <a:latin typeface="Calibri" panose="020F0502020204030204" pitchFamily="34" charset="0"/>
+            </a:endParaRPr>
+          </a:p>
+        </p:txBody>
+      </p:sp>
+    </p:spTree>
+    <p:extLst>
+      <p:ext uri="{BB962C8B-B14F-4D97-AF65-F5344CB8AC3E}">
+        <p14:creationId xmlns:p14="http://schemas.microsoft.com/office/powerpoint/2010/main" val="567329468"/>
+      </p:ext>
+    </p:extLst>
+  </p:cSld>
+  <p:clrMapOvr>
+    <a:masterClrMapping/>
+  </p:clrMapOvr>
+  <p:timing>
+    <p:tnLst>
+      <p:par>
+        <p:cTn id="1" dur="indefinite" restart="never" nodeType="tmRoot"/>
+      </p:par>
+    </p:tnLst>
+  </p:timing>
+</p:sld>
+</file>
+
+<file path=ppt/slides/slide5.xml><?xml version="1.0" encoding="utf-8"?>
 <p:sld xmlns:a="http://schemas.openxmlformats.org/drawingml/2006/main" xmlns:r="http://schemas.openxmlformats.org/officeDocument/2006/relationships" xmlns:p="http://schemas.openxmlformats.org/presentationml/2006/main">
   <p:cSld>
     <p:spTree>
@@ -5834,7 +5996,7 @@
 </p:sld>
 </file>
 
-<file path=ppt/slides/slide5.xml><?xml version="1.0" encoding="utf-8"?>
+<file path=ppt/slides/slide6.xml><?xml version="1.0" encoding="utf-8"?>
 <p:sld xmlns:a="http://schemas.openxmlformats.org/drawingml/2006/main" xmlns:r="http://schemas.openxmlformats.org/officeDocument/2006/relationships" xmlns:p="http://schemas.openxmlformats.org/presentationml/2006/main">
   <p:cSld>
     <p:spTree>

</xml_diff>

<commit_message>
nouveau format des fichiers. J'utilise maintenant que des fichiers textes, sauf pour les slides à afficher
</commit_message>
<xml_diff>
--- a/semaine2/semaine2-1.pptx
+++ b/semaine2/semaine2-1.pptx
@@ -5,18 +5,15 @@
     <p:sldMasterId id="2147483649" r:id="rId1"/>
   </p:sldMasterIdLst>
   <p:notesMasterIdLst>
-    <p:notesMasterId r:id="rId8"/>
+    <p:notesMasterId r:id="rId5"/>
   </p:notesMasterIdLst>
   <p:handoutMasterIdLst>
-    <p:handoutMasterId r:id="rId9"/>
+    <p:handoutMasterId r:id="rId6"/>
   </p:handoutMasterIdLst>
   <p:sldIdLst>
-    <p:sldId id="893" r:id="rId2"/>
-    <p:sldId id="895" r:id="rId3"/>
+    <p:sldId id="895" r:id="rId2"/>
+    <p:sldId id="897" r:id="rId3"/>
     <p:sldId id="896" r:id="rId4"/>
-    <p:sldId id="898" r:id="rId5"/>
-    <p:sldId id="897" r:id="rId6"/>
-    <p:sldId id="891" r:id="rId7"/>
   </p:sldIdLst>
   <p:sldSz cx="9144000" cy="6858000" type="screen4x3"/>
   <p:notesSz cx="7099300" cy="10234613"/>
@@ -150,12 +147,9 @@
       <p14:sectionLst xmlns:p14="http://schemas.microsoft.com/office/powerpoint/2010/main">
         <p14:section name="Section par défaut" id="{28C650F0-13B2-49C9-9ED4-D40CD07835D6}">
           <p14:sldIdLst>
-            <p14:sldId id="893"/>
             <p14:sldId id="895"/>
+            <p14:sldId id="897"/>
             <p14:sldId id="896"/>
-            <p14:sldId id="898"/>
-            <p14:sldId id="897"/>
-            <p14:sldId id="891"/>
           </p14:sldIdLst>
         </p14:section>
       </p14:sectionLst>
@@ -955,6 +949,71 @@
           <a:bodyPr/>
           <a:lstStyle/>
           <a:p>
+            <a:pPr marL="0" marR="0" indent="0" algn="l" defTabSz="914400" rtl="0" eaLnBrk="0" fontAlgn="base" latinLnBrk="0" hangingPunct="0">
+              <a:lnSpc>
+                <a:spcPct val="100000"/>
+              </a:lnSpc>
+              <a:spcBef>
+                <a:spcPct val="30000"/>
+              </a:spcBef>
+              <a:spcAft>
+                <a:spcPct val="0"/>
+              </a:spcAft>
+              <a:buClrTx/>
+              <a:buSzTx/>
+              <a:buFontTx/>
+              <a:buNone/>
+              <a:tabLst/>
+              <a:defRPr/>
+            </a:pPr>
+            <a:r>
+              <a:rPr lang="fr-FR" u="sng" dirty="0" smtClean="0"/>
+              <a:t>En surimpression pendant que je</a:t>
+            </a:r>
+            <a:r>
+              <a:rPr lang="fr-FR" u="sng" baseline="0" dirty="0" smtClean="0"/>
+              <a:t> parle</a:t>
+            </a:r>
+            <a:endParaRPr lang="fr-FR" u="sng" dirty="0" smtClean="0"/>
+          </a:p>
+          <a:p>
+            <a:r>
+              <a:rPr lang="fr-FR" dirty="0" err="1" smtClean="0"/>
+              <a:t>int</a:t>
+            </a:r>
+            <a:endParaRPr lang="fr-FR" dirty="0" smtClean="0"/>
+          </a:p>
+          <a:p>
+            <a:r>
+              <a:rPr lang="fr-FR" dirty="0" smtClean="0"/>
+              <a:t>long</a:t>
+            </a:r>
+          </a:p>
+          <a:p>
+            <a:r>
+              <a:rPr lang="fr-FR" dirty="0" err="1" smtClean="0"/>
+              <a:t>float</a:t>
+            </a:r>
+            <a:endParaRPr lang="fr-FR" dirty="0" smtClean="0"/>
+          </a:p>
+          <a:p>
+            <a:r>
+              <a:rPr lang="fr-FR" dirty="0" err="1" smtClean="0"/>
+              <a:t>complex</a:t>
+            </a:r>
+            <a:endParaRPr lang="fr-FR" dirty="0" smtClean="0"/>
+          </a:p>
+          <a:p>
+            <a:r>
+              <a:rPr lang="fr-FR" dirty="0" err="1" smtClean="0"/>
+              <a:t>bool</a:t>
+            </a:r>
+            <a:endParaRPr lang="fr-FR" dirty="0" smtClean="0"/>
+          </a:p>
+          <a:p>
+            <a:endParaRPr lang="fr-FR" dirty="0" smtClean="0"/>
+          </a:p>
+          <a:p>
             <a:endParaRPr lang="fr-FR" dirty="0"/>
           </a:p>
         </p:txBody>
@@ -991,346 +1050,7 @@
     </p:spTree>
     <p:extLst>
       <p:ext uri="{BB962C8B-B14F-4D97-AF65-F5344CB8AC3E}">
-        <p14:creationId xmlns:p14="http://schemas.microsoft.com/office/powerpoint/2010/main" val="3136169777"/>
-      </p:ext>
-    </p:extLst>
-  </p:cSld>
-  <p:clrMapOvr>
-    <a:masterClrMapping/>
-  </p:clrMapOvr>
-</p:notes>
-</file>
-
-<file path=ppt/notesSlides/notesSlide2.xml><?xml version="1.0" encoding="utf-8"?>
-<p:notes xmlns:a="http://schemas.openxmlformats.org/drawingml/2006/main" xmlns:r="http://schemas.openxmlformats.org/officeDocument/2006/relationships" xmlns:p="http://schemas.openxmlformats.org/presentationml/2006/main">
-  <p:cSld>
-    <p:spTree>
-      <p:nvGrpSpPr>
-        <p:cNvPr id="1" name=""/>
-        <p:cNvGrpSpPr/>
-        <p:nvPr/>
-      </p:nvGrpSpPr>
-      <p:grpSpPr>
-        <a:xfrm>
-          <a:off x="0" y="0"/>
-          <a:ext cx="0" cy="0"/>
-          <a:chOff x="0" y="0"/>
-          <a:chExt cx="0" cy="0"/>
-        </a:xfrm>
-      </p:grpSpPr>
-      <p:sp>
-        <p:nvSpPr>
-          <p:cNvPr id="2" name="Espace réservé de l'image des diapositives 1"/>
-          <p:cNvSpPr>
-            <a:spLocks noGrp="1" noRot="1" noChangeAspect="1"/>
-          </p:cNvSpPr>
-          <p:nvPr>
-            <p:ph type="sldImg"/>
-          </p:nvPr>
-        </p:nvSpPr>
-        <p:spPr/>
-      </p:sp>
-      <p:sp>
-        <p:nvSpPr>
-          <p:cNvPr id="3" name="Espace réservé des commentaires 2"/>
-          <p:cNvSpPr>
-            <a:spLocks noGrp="1"/>
-          </p:cNvSpPr>
-          <p:nvPr>
-            <p:ph type="body" idx="1"/>
-          </p:nvPr>
-        </p:nvSpPr>
-        <p:spPr/>
-        <p:txBody>
-          <a:bodyPr/>
-          <a:lstStyle/>
-          <a:p>
-            <a:endParaRPr lang="fr-FR" dirty="0"/>
-          </a:p>
-        </p:txBody>
-      </p:sp>
-      <p:sp>
-        <p:nvSpPr>
-          <p:cNvPr id="4" name="Espace réservé du numéro de diapositive 3"/>
-          <p:cNvSpPr>
-            <a:spLocks noGrp="1"/>
-          </p:cNvSpPr>
-          <p:nvPr>
-            <p:ph type="sldNum" sz="quarter" idx="10"/>
-          </p:nvPr>
-        </p:nvSpPr>
-        <p:spPr/>
-        <p:txBody>
-          <a:bodyPr/>
-          <a:lstStyle/>
-          <a:p>
-            <a:pPr>
-              <a:defRPr/>
-            </a:pPr>
-            <a:fld id="{9E8EB9F5-F2F7-4A48-A943-9B409357C15C}" type="slidenum">
-              <a:rPr lang="en-US" smtClean="0"/>
-              <a:pPr>
-                <a:defRPr/>
-              </a:pPr>
-              <a:t>2</a:t>
-            </a:fld>
-            <a:endParaRPr lang="en-US"/>
-          </a:p>
-        </p:txBody>
-      </p:sp>
-    </p:spTree>
-    <p:extLst>
-      <p:ext uri="{BB962C8B-B14F-4D97-AF65-F5344CB8AC3E}">
         <p14:creationId xmlns:p14="http://schemas.microsoft.com/office/powerpoint/2010/main" val="929701624"/>
-      </p:ext>
-    </p:extLst>
-  </p:cSld>
-  <p:clrMapOvr>
-    <a:masterClrMapping/>
-  </p:clrMapOvr>
-</p:notes>
-</file>
-
-<file path=ppt/notesSlides/notesSlide3.xml><?xml version="1.0" encoding="utf-8"?>
-<p:notes xmlns:a="http://schemas.openxmlformats.org/drawingml/2006/main" xmlns:r="http://schemas.openxmlformats.org/officeDocument/2006/relationships" xmlns:p="http://schemas.openxmlformats.org/presentationml/2006/main">
-  <p:cSld>
-    <p:spTree>
-      <p:nvGrpSpPr>
-        <p:cNvPr id="1" name=""/>
-        <p:cNvGrpSpPr/>
-        <p:nvPr/>
-      </p:nvGrpSpPr>
-      <p:grpSpPr>
-        <a:xfrm>
-          <a:off x="0" y="0"/>
-          <a:ext cx="0" cy="0"/>
-          <a:chOff x="0" y="0"/>
-          <a:chExt cx="0" cy="0"/>
-        </a:xfrm>
-      </p:grpSpPr>
-      <p:sp>
-        <p:nvSpPr>
-          <p:cNvPr id="2" name="Espace réservé de l'image des diapositives 1"/>
-          <p:cNvSpPr>
-            <a:spLocks noGrp="1" noRot="1" noChangeAspect="1"/>
-          </p:cNvSpPr>
-          <p:nvPr>
-            <p:ph type="sldImg"/>
-          </p:nvPr>
-        </p:nvSpPr>
-        <p:spPr/>
-      </p:sp>
-      <p:sp>
-        <p:nvSpPr>
-          <p:cNvPr id="3" name="Espace réservé des commentaires 2"/>
-          <p:cNvSpPr>
-            <a:spLocks noGrp="1"/>
-          </p:cNvSpPr>
-          <p:nvPr>
-            <p:ph type="body" idx="1"/>
-          </p:nvPr>
-        </p:nvSpPr>
-        <p:spPr/>
-        <p:txBody>
-          <a:bodyPr/>
-          <a:lstStyle/>
-          <a:p>
-            <a:r>
-              <a:rPr lang="fr-FR" dirty="0" smtClean="0"/>
-              <a:t>Comment manipule-t-on</a:t>
-            </a:r>
-            <a:r>
-              <a:rPr lang="fr-FR" baseline="0" dirty="0" smtClean="0"/>
-              <a:t> des objets en Python ?</a:t>
-            </a:r>
-          </a:p>
-          <a:p>
-            <a:r>
-              <a:rPr lang="fr-FR" baseline="0" dirty="0" smtClean="0"/>
-              <a:t>Comme dans tous les langages de programmation on peut donner un nom, on appelle ce nom une variable. </a:t>
-            </a:r>
-          </a:p>
-          <a:p>
-            <a:endParaRPr lang="fr-FR" baseline="0" dirty="0" smtClean="0"/>
-          </a:p>
-          <a:p>
-            <a:r>
-              <a:rPr lang="fr-FR" baseline="0" dirty="0" smtClean="0"/>
-              <a:t>Expliquer l’animation.</a:t>
-            </a:r>
-          </a:p>
-          <a:p>
-            <a:endParaRPr lang="fr-FR" baseline="0" dirty="0" smtClean="0"/>
-          </a:p>
-          <a:p>
-            <a:r>
-              <a:rPr lang="fr-FR" baseline="0" dirty="0" smtClean="0"/>
-              <a:t>À la fin noter le typage dynamique, l’objet à un type, la variable donne juste un lien vers un objet. </a:t>
-            </a:r>
-            <a:endParaRPr lang="fr-FR" dirty="0"/>
-          </a:p>
-        </p:txBody>
-      </p:sp>
-      <p:sp>
-        <p:nvSpPr>
-          <p:cNvPr id="4" name="Espace réservé du numéro de diapositive 3"/>
-          <p:cNvSpPr>
-            <a:spLocks noGrp="1"/>
-          </p:cNvSpPr>
-          <p:nvPr>
-            <p:ph type="sldNum" sz="quarter" idx="10"/>
-          </p:nvPr>
-        </p:nvSpPr>
-        <p:spPr/>
-        <p:txBody>
-          <a:bodyPr/>
-          <a:lstStyle/>
-          <a:p>
-            <a:pPr>
-              <a:defRPr/>
-            </a:pPr>
-            <a:fld id="{9E8EB9F5-F2F7-4A48-A943-9B409357C15C}" type="slidenum">
-              <a:rPr lang="en-US" smtClean="0"/>
-              <a:pPr>
-                <a:defRPr/>
-              </a:pPr>
-              <a:t>5</a:t>
-            </a:fld>
-            <a:endParaRPr lang="en-US"/>
-          </a:p>
-        </p:txBody>
-      </p:sp>
-    </p:spTree>
-    <p:extLst>
-      <p:ext uri="{BB962C8B-B14F-4D97-AF65-F5344CB8AC3E}">
-        <p14:creationId xmlns:p14="http://schemas.microsoft.com/office/powerpoint/2010/main" val="3493514724"/>
-      </p:ext>
-    </p:extLst>
-  </p:cSld>
-  <p:clrMapOvr>
-    <a:masterClrMapping/>
-  </p:clrMapOvr>
-</p:notes>
-</file>
-
-<file path=ppt/notesSlides/notesSlide4.xml><?xml version="1.0" encoding="utf-8"?>
-<p:notes xmlns:a="http://schemas.openxmlformats.org/drawingml/2006/main" xmlns:r="http://schemas.openxmlformats.org/officeDocument/2006/relationships" xmlns:p="http://schemas.openxmlformats.org/presentationml/2006/main">
-  <p:cSld>
-    <p:spTree>
-      <p:nvGrpSpPr>
-        <p:cNvPr id="1" name=""/>
-        <p:cNvGrpSpPr/>
-        <p:nvPr/>
-      </p:nvGrpSpPr>
-      <p:grpSpPr>
-        <a:xfrm>
-          <a:off x="0" y="0"/>
-          <a:ext cx="0" cy="0"/>
-          <a:chOff x="0" y="0"/>
-          <a:chExt cx="0" cy="0"/>
-        </a:xfrm>
-      </p:grpSpPr>
-      <p:sp>
-        <p:nvSpPr>
-          <p:cNvPr id="2" name="Espace réservé de l'image des diapositives 1"/>
-          <p:cNvSpPr>
-            <a:spLocks noGrp="1" noRot="1" noChangeAspect="1"/>
-          </p:cNvSpPr>
-          <p:nvPr>
-            <p:ph type="sldImg"/>
-          </p:nvPr>
-        </p:nvSpPr>
-        <p:spPr/>
-      </p:sp>
-      <p:sp>
-        <p:nvSpPr>
-          <p:cNvPr id="3" name="Espace réservé des commentaires 2"/>
-          <p:cNvSpPr>
-            <a:spLocks noGrp="1"/>
-          </p:cNvSpPr>
-          <p:nvPr>
-            <p:ph type="body" idx="1"/>
-          </p:nvPr>
-        </p:nvSpPr>
-        <p:spPr/>
-        <p:txBody>
-          <a:bodyPr/>
-          <a:lstStyle/>
-          <a:p>
-            <a:r>
-              <a:rPr lang="fr-FR" dirty="0" smtClean="0"/>
-              <a:t>Immutable est un néologisme</a:t>
-            </a:r>
-            <a:r>
-              <a:rPr lang="fr-FR" baseline="0" dirty="0" smtClean="0"/>
-              <a:t> (immuable en français), mais il permet </a:t>
-            </a:r>
-          </a:p>
-          <a:p>
-            <a:r>
-              <a:rPr lang="fr-FR" baseline="0" dirty="0" smtClean="0"/>
-              <a:t>Un meilleur parallèle avec la doc anglaise. </a:t>
-            </a:r>
-          </a:p>
-          <a:p>
-            <a:endParaRPr lang="fr-FR" baseline="0" dirty="0" smtClean="0"/>
-          </a:p>
-          <a:p>
-            <a:r>
-              <a:rPr lang="fr-FR" baseline="0" dirty="0" smtClean="0"/>
-              <a:t>Documentation sur tous les </a:t>
-            </a:r>
-            <a:r>
-              <a:rPr lang="fr-FR" baseline="0" dirty="0" err="1" smtClean="0"/>
-              <a:t>built</a:t>
-            </a:r>
-            <a:r>
-              <a:rPr lang="fr-FR" baseline="0" dirty="0" smtClean="0"/>
-              <a:t>-in types dans </a:t>
-            </a:r>
-          </a:p>
-          <a:p>
-            <a:r>
-              <a:rPr lang="fr-FR" dirty="0" smtClean="0"/>
-              <a:t>https://docs.python.org/2/library/stdtypes.html</a:t>
-            </a:r>
-            <a:endParaRPr lang="fr-FR" dirty="0"/>
-          </a:p>
-        </p:txBody>
-      </p:sp>
-      <p:sp>
-        <p:nvSpPr>
-          <p:cNvPr id="4" name="Espace réservé du numéro de diapositive 3"/>
-          <p:cNvSpPr>
-            <a:spLocks noGrp="1"/>
-          </p:cNvSpPr>
-          <p:nvPr>
-            <p:ph type="sldNum" sz="quarter" idx="10"/>
-          </p:nvPr>
-        </p:nvSpPr>
-        <p:spPr/>
-        <p:txBody>
-          <a:bodyPr/>
-          <a:lstStyle/>
-          <a:p>
-            <a:pPr>
-              <a:defRPr/>
-            </a:pPr>
-            <a:fld id="{9E8EB9F5-F2F7-4A48-A943-9B409357C15C}" type="slidenum">
-              <a:rPr lang="en-US" smtClean="0"/>
-              <a:pPr>
-                <a:defRPr/>
-              </a:pPr>
-              <a:t>6</a:t>
-            </a:fld>
-            <a:endParaRPr lang="en-US"/>
-          </a:p>
-        </p:txBody>
-      </p:sp>
-    </p:spTree>
-    <p:extLst>
-      <p:ext uri="{BB962C8B-B14F-4D97-AF65-F5344CB8AC3E}">
-        <p14:creationId xmlns:p14="http://schemas.microsoft.com/office/powerpoint/2010/main" val="733846977"/>
       </p:ext>
     </p:extLst>
   </p:cSld>
@@ -4654,7 +4374,11 @@
           <a:p>
             <a:r>
               <a:rPr lang="fr-FR" dirty="0" smtClean="0"/>
-              <a:t>Sujet de la semaine</a:t>
+              <a:t>Résumé de la </a:t>
+            </a:r>
+            <a:r>
+              <a:rPr lang="fr-FR" dirty="0" smtClean="0"/>
+              <a:t>séquence (25s)</a:t>
             </a:r>
             <a:endParaRPr lang="fr-FR" dirty="0"/>
           </a:p>
@@ -4676,51 +4400,78 @@
           <a:lstStyle/>
           <a:p>
             <a:r>
-              <a:rPr lang="fr-FR" dirty="0" smtClean="0"/>
-              <a:t>Cette semaine nous allons parler </a:t>
-            </a:r>
+              <a:rPr lang="fr-FR" sz="2800" dirty="0" smtClean="0"/>
+              <a:t>Bonjour, nous allons voir dans cette vidéo les 5 types numériques qui existent en Python : les </a:t>
+            </a:r>
+            <a:r>
+              <a:rPr lang="fr-FR" sz="2800" dirty="0" err="1" smtClean="0"/>
+              <a:t>int</a:t>
+            </a:r>
+            <a:r>
+              <a:rPr lang="fr-FR" sz="2800" dirty="0" smtClean="0"/>
+              <a:t> qui représentent des entiers, les long </a:t>
+            </a:r>
+            <a:r>
+              <a:rPr lang="fr-FR" sz="2800" dirty="0"/>
+              <a:t>qui représentent des </a:t>
+            </a:r>
+            <a:r>
+              <a:rPr lang="fr-FR" sz="2800" dirty="0" smtClean="0"/>
+              <a:t>entiers de précision illimité, les </a:t>
+            </a:r>
+            <a:r>
+              <a:rPr lang="fr-FR" sz="2800" dirty="0" err="1" smtClean="0"/>
+              <a:t>float</a:t>
+            </a:r>
+            <a:r>
+              <a:rPr lang="fr-FR" sz="2800" dirty="0" smtClean="0"/>
+              <a:t> </a:t>
+            </a:r>
+            <a:r>
+              <a:rPr lang="fr-FR" sz="2800" dirty="0"/>
+              <a:t>qui représentent des </a:t>
+            </a:r>
+            <a:r>
+              <a:rPr lang="fr-FR" sz="2800" dirty="0" smtClean="0"/>
+              <a:t>nombre décimaux, les </a:t>
+            </a:r>
+            <a:r>
+              <a:rPr lang="fr-FR" sz="2800" dirty="0" err="1" smtClean="0"/>
+              <a:t>complex</a:t>
+            </a:r>
+            <a:r>
+              <a:rPr lang="fr-FR" sz="2800" dirty="0" smtClean="0"/>
+              <a:t> </a:t>
+            </a:r>
+            <a:r>
+              <a:rPr lang="fr-FR" sz="2800" dirty="0"/>
+              <a:t>qui représentent des </a:t>
+            </a:r>
+            <a:r>
+              <a:rPr lang="fr-FR" sz="2800" dirty="0" smtClean="0"/>
+              <a:t>nombres complexes et les </a:t>
+            </a:r>
+            <a:r>
+              <a:rPr lang="fr-FR" sz="2800" dirty="0" err="1" smtClean="0"/>
+              <a:t>bool</a:t>
+            </a:r>
+            <a:r>
+              <a:rPr lang="fr-FR" sz="2800" dirty="0" smtClean="0"/>
+              <a:t> </a:t>
+            </a:r>
+            <a:r>
+              <a:rPr lang="fr-FR" sz="2800" dirty="0"/>
+              <a:t>qui représentent des </a:t>
+            </a:r>
+            <a:r>
+              <a:rPr lang="fr-FR" sz="2800" dirty="0" smtClean="0"/>
+              <a:t>booléens, c’est-à-dire des nombres qui prennent soit la valeur 1 soit la valeur 0. Ouvrons un terminal interactif pour jouer avec ces types numériques… </a:t>
+            </a:r>
+            <a:endParaRPr lang="fr-FR" sz="2800" dirty="0" smtClean="0"/>
           </a:p>
           <a:p>
             <a:pPr lvl="1"/>
-            <a:r>
-              <a:rPr lang="fr-FR" dirty="0"/>
-              <a:t>D</a:t>
-            </a:r>
-            <a:r>
-              <a:rPr lang="fr-FR" dirty="0" smtClean="0"/>
-              <a:t>es types de base en Python</a:t>
-            </a:r>
-          </a:p>
-          <a:p>
-            <a:pPr lvl="2"/>
-            <a:r>
-              <a:rPr lang="fr-FR" dirty="0" smtClean="0"/>
-              <a:t>Comportement uniforme </a:t>
-            </a:r>
-          </a:p>
-          <a:p>
-            <a:pPr lvl="2"/>
-            <a:r>
-              <a:rPr lang="fr-FR" dirty="0" smtClean="0"/>
-              <a:t>Objets très puissants et polyvalents </a:t>
-            </a:r>
-          </a:p>
-          <a:p>
-            <a:pPr lvl="1"/>
-            <a:r>
-              <a:rPr lang="fr-FR" dirty="0" smtClean="0"/>
-              <a:t>Du typage dynamique et des références partagés</a:t>
-            </a:r>
-          </a:p>
-          <a:p>
-            <a:pPr lvl="2"/>
-            <a:r>
-              <a:rPr lang="fr-FR" dirty="0" smtClean="0"/>
-              <a:t>Une des trois clefs de la compréhension de Python</a:t>
-            </a:r>
-          </a:p>
-          <a:p>
-            <a:endParaRPr lang="fr-FR" dirty="0"/>
+            <a:endParaRPr lang="fr-FR" sz="2400" dirty="0"/>
           </a:p>
         </p:txBody>
       </p:sp>
@@ -4772,7 +4523,7 @@
     </p:spTree>
     <p:extLst>
       <p:ext uri="{BB962C8B-B14F-4D97-AF65-F5344CB8AC3E}">
-        <p14:creationId xmlns:p14="http://schemas.microsoft.com/office/powerpoint/2010/main" val="233224714"/>
+        <p14:creationId xmlns:p14="http://schemas.microsoft.com/office/powerpoint/2010/main" val="1143164526"/>
       </p:ext>
     </p:extLst>
   </p:cSld>
@@ -4808,12 +4559,12 @@
       </p:grpSpPr>
       <p:sp>
         <p:nvSpPr>
-          <p:cNvPr id="2" name="Titre 1"/>
+          <p:cNvPr id="4" name="Titre 3"/>
           <p:cNvSpPr>
             <a:spLocks noGrp="1"/>
           </p:cNvSpPr>
           <p:nvPr>
-            <p:ph type="title"/>
+            <p:ph type="ctrTitle"/>
           </p:nvPr>
         </p:nvSpPr>
         <p:spPr/>
@@ -4823,7 +4574,11 @@
           <a:p>
             <a:r>
               <a:rPr lang="fr-FR" dirty="0" smtClean="0"/>
-              <a:t>Résumé de la séquence</a:t>
+              <a:t>Total : </a:t>
+            </a:r>
+            <a:r>
+              <a:rPr lang="fr-FR" dirty="0" smtClean="0"/>
+              <a:t>25 secondes</a:t>
             </a:r>
             <a:endParaRPr lang="fr-FR" dirty="0"/>
           </a:p>
@@ -4831,12 +4586,12 @@
       </p:sp>
       <p:sp>
         <p:nvSpPr>
-          <p:cNvPr id="3" name="Espace réservé du contenu 2"/>
+          <p:cNvPr id="5" name="Sous-titre 4"/>
           <p:cNvSpPr>
             <a:spLocks noGrp="1"/>
           </p:cNvSpPr>
           <p:nvPr>
-            <p:ph idx="1"/>
+            <p:ph type="subTitle" idx="1"/>
           </p:nvPr>
         </p:nvSpPr>
         <p:spPr/>
@@ -4844,66 +4599,14 @@
           <a:bodyPr/>
           <a:lstStyle/>
           <a:p>
-            <a:r>
-              <a:rPr lang="fr-FR" dirty="0" smtClean="0"/>
-              <a:t>À la fin de cette vidéo vous connaitrez la notion de typage dynamique et vous  connaitrez tous les types numériques en python et saurez les manipuler</a:t>
-            </a:r>
-          </a:p>
-          <a:p>
-            <a:pPr lvl="1"/>
-            <a:endParaRPr lang="fr-FR" dirty="0"/>
-          </a:p>
-        </p:txBody>
-      </p:sp>
-      <p:sp>
-        <p:nvSpPr>
-          <p:cNvPr id="4" name="ZoneTexte 3"/>
-          <p:cNvSpPr txBox="1"/>
-          <p:nvPr/>
-        </p:nvSpPr>
-        <p:spPr>
-          <a:xfrm>
-            <a:off x="0" y="92076"/>
-            <a:ext cx="1537855" cy="400110"/>
-          </a:xfrm>
-          <a:prstGeom prst="rect">
-            <a:avLst/>
-          </a:prstGeom>
-          <a:noFill/>
-          <a:ln>
-            <a:solidFill>
-              <a:srgbClr val="FF0000"/>
-            </a:solidFill>
-          </a:ln>
-        </p:spPr>
-        <p:txBody>
-          <a:bodyPr wrap="square" rtlCol="0">
-            <a:spAutoFit/>
-          </a:bodyPr>
-          <a:lstStyle/>
-          <a:p>
-            <a:r>
-              <a:rPr lang="fr-FR" sz="2000" dirty="0" smtClean="0">
-                <a:solidFill>
-                  <a:srgbClr val="FF0000"/>
-                </a:solidFill>
-                <a:latin typeface="Calibri" panose="020F0502020204030204" pitchFamily="34" charset="0"/>
-              </a:rPr>
-              <a:t>prompteur</a:t>
-            </a:r>
-            <a:endParaRPr lang="fr-FR" sz="2000" dirty="0">
-              <a:solidFill>
-                <a:srgbClr val="FF0000"/>
-              </a:solidFill>
-              <a:latin typeface="Calibri" panose="020F0502020204030204" pitchFamily="34" charset="0"/>
-            </a:endParaRPr>
+            <a:endParaRPr lang="fr-FR"/>
           </a:p>
         </p:txBody>
       </p:sp>
     </p:spTree>
     <p:extLst>
       <p:ext uri="{BB962C8B-B14F-4D97-AF65-F5344CB8AC3E}">
-        <p14:creationId xmlns:p14="http://schemas.microsoft.com/office/powerpoint/2010/main" val="1143164526"/>
+        <p14:creationId xmlns:p14="http://schemas.microsoft.com/office/powerpoint/2010/main" val="3012569664"/>
       </p:ext>
     </p:extLst>
   </p:cSld>
@@ -4952,10 +4655,6 @@
           <a:bodyPr/>
           <a:lstStyle/>
           <a:p>
-            <a:r>
-              <a:rPr lang="fr-FR" dirty="0" smtClean="0"/>
-              <a:t>Nouvelle séquence</a:t>
-            </a:r>
             <a:endParaRPr lang="fr-FR" dirty="0"/>
           </a:p>
         </p:txBody>
@@ -4982,1185 +4681,7 @@
     </p:spTree>
     <p:extLst>
       <p:ext uri="{BB962C8B-B14F-4D97-AF65-F5344CB8AC3E}">
-        <p14:creationId xmlns:p14="http://schemas.microsoft.com/office/powerpoint/2010/main" val="3107198915"/>
-      </p:ext>
-    </p:extLst>
-  </p:cSld>
-  <p:clrMapOvr>
-    <a:masterClrMapping/>
-  </p:clrMapOvr>
-  <p:timing>
-    <p:tnLst>
-      <p:par>
-        <p:cTn id="1" dur="indefinite" restart="never" nodeType="tmRoot"/>
-      </p:par>
-    </p:tnLst>
-  </p:timing>
-</p:sld>
-</file>
-
-<file path=ppt/slides/slide4.xml><?xml version="1.0" encoding="utf-8"?>
-<p:sld xmlns:a="http://schemas.openxmlformats.org/drawingml/2006/main" xmlns:r="http://schemas.openxmlformats.org/officeDocument/2006/relationships" xmlns:p="http://schemas.openxmlformats.org/presentationml/2006/main">
-  <p:cSld>
-    <p:spTree>
-      <p:nvGrpSpPr>
-        <p:cNvPr id="1" name=""/>
-        <p:cNvGrpSpPr/>
-        <p:nvPr/>
-      </p:nvGrpSpPr>
-      <p:grpSpPr>
-        <a:xfrm>
-          <a:off x="0" y="0"/>
-          <a:ext cx="0" cy="0"/>
-          <a:chOff x="0" y="0"/>
-          <a:chExt cx="0" cy="0"/>
-        </a:xfrm>
-      </p:grpSpPr>
-      <p:sp>
-        <p:nvSpPr>
-          <p:cNvPr id="2" name="Titre 1"/>
-          <p:cNvSpPr>
-            <a:spLocks noGrp="1"/>
-          </p:cNvSpPr>
-          <p:nvPr>
-            <p:ph type="title"/>
-          </p:nvPr>
-        </p:nvSpPr>
-        <p:spPr/>
-        <p:txBody>
-          <a:bodyPr/>
-          <a:lstStyle/>
-          <a:p>
-            <a:r>
-              <a:rPr lang="fr-FR" dirty="0" smtClean="0"/>
-              <a:t>En Python, tout est un objet</a:t>
-            </a:r>
-            <a:endParaRPr lang="fr-FR" dirty="0"/>
-          </a:p>
-        </p:txBody>
-      </p:sp>
-      <p:sp>
-        <p:nvSpPr>
-          <p:cNvPr id="3" name="Espace réservé du contenu 2"/>
-          <p:cNvSpPr>
-            <a:spLocks noGrp="1"/>
-          </p:cNvSpPr>
-          <p:nvPr>
-            <p:ph idx="1"/>
-          </p:nvPr>
-        </p:nvSpPr>
-        <p:spPr/>
-        <p:txBody>
-          <a:bodyPr/>
-          <a:lstStyle/>
-          <a:p>
-            <a:r>
-              <a:rPr lang="fr-FR" dirty="0" smtClean="0"/>
-              <a:t>Grande uniformité qui simplifie et accélère le développement </a:t>
-            </a:r>
-          </a:p>
-          <a:p>
-            <a:r>
-              <a:rPr lang="fr-FR" dirty="0" smtClean="0"/>
-              <a:t>On accède à tous les objets par leur référence en mémoire</a:t>
-            </a:r>
-          </a:p>
-          <a:p>
-            <a:pPr lvl="1"/>
-            <a:r>
-              <a:rPr lang="fr-FR" dirty="0" smtClean="0"/>
-              <a:t>Mais on ne manipule jamais directement les références mémoires</a:t>
-            </a:r>
-          </a:p>
-          <a:p>
-            <a:pPr lvl="1"/>
-            <a:r>
-              <a:rPr lang="fr-FR" dirty="0" smtClean="0"/>
-              <a:t>On utilise en général l’affectation</a:t>
-            </a:r>
-          </a:p>
-          <a:p>
-            <a:endParaRPr lang="fr-FR" dirty="0"/>
-          </a:p>
-          <a:p>
-            <a:r>
-              <a:rPr lang="fr-FR" dirty="0" smtClean="0"/>
-              <a:t>Python est livré avec beaucoup d’objets de base, ce sont les types de base</a:t>
-            </a:r>
-          </a:p>
-          <a:p>
-            <a:pPr lvl="1"/>
-            <a:endParaRPr lang="fr-FR" dirty="0"/>
-          </a:p>
-        </p:txBody>
-      </p:sp>
-      <p:sp>
-        <p:nvSpPr>
-          <p:cNvPr id="4" name="ZoneTexte 3"/>
-          <p:cNvSpPr txBox="1"/>
-          <p:nvPr/>
-        </p:nvSpPr>
-        <p:spPr>
-          <a:xfrm>
-            <a:off x="0" y="92076"/>
-            <a:ext cx="1537855" cy="400110"/>
-          </a:xfrm>
-          <a:prstGeom prst="rect">
-            <a:avLst/>
-          </a:prstGeom>
-          <a:noFill/>
-          <a:ln>
-            <a:solidFill>
-              <a:srgbClr val="FF0000"/>
-            </a:solidFill>
-          </a:ln>
-        </p:spPr>
-        <p:txBody>
-          <a:bodyPr wrap="square" rtlCol="0">
-            <a:spAutoFit/>
-          </a:bodyPr>
-          <a:lstStyle/>
-          <a:p>
-            <a:r>
-              <a:rPr lang="fr-FR" sz="2000" dirty="0" smtClean="0">
-                <a:solidFill>
-                  <a:srgbClr val="FF0000"/>
-                </a:solidFill>
-                <a:latin typeface="Calibri" panose="020F0502020204030204" pitchFamily="34" charset="0"/>
-              </a:rPr>
-              <a:t>prompteur</a:t>
-            </a:r>
-            <a:endParaRPr lang="fr-FR" sz="2000" dirty="0">
-              <a:solidFill>
-                <a:srgbClr val="FF0000"/>
-              </a:solidFill>
-              <a:latin typeface="Calibri" panose="020F0502020204030204" pitchFamily="34" charset="0"/>
-            </a:endParaRPr>
-          </a:p>
-        </p:txBody>
-      </p:sp>
-    </p:spTree>
-    <p:extLst>
-      <p:ext uri="{BB962C8B-B14F-4D97-AF65-F5344CB8AC3E}">
-        <p14:creationId xmlns:p14="http://schemas.microsoft.com/office/powerpoint/2010/main" val="567329468"/>
-      </p:ext>
-    </p:extLst>
-  </p:cSld>
-  <p:clrMapOvr>
-    <a:masterClrMapping/>
-  </p:clrMapOvr>
-  <p:timing>
-    <p:tnLst>
-      <p:par>
-        <p:cTn id="1" dur="indefinite" restart="never" nodeType="tmRoot"/>
-      </p:par>
-    </p:tnLst>
-  </p:timing>
-</p:sld>
-</file>
-
-<file path=ppt/slides/slide5.xml><?xml version="1.0" encoding="utf-8"?>
-<p:sld xmlns:a="http://schemas.openxmlformats.org/drawingml/2006/main" xmlns:r="http://schemas.openxmlformats.org/officeDocument/2006/relationships" xmlns:p="http://schemas.openxmlformats.org/presentationml/2006/main">
-  <p:cSld>
-    <p:spTree>
-      <p:nvGrpSpPr>
-        <p:cNvPr id="1" name=""/>
-        <p:cNvGrpSpPr/>
-        <p:nvPr/>
-      </p:nvGrpSpPr>
-      <p:grpSpPr>
-        <a:xfrm>
-          <a:off x="0" y="0"/>
-          <a:ext cx="0" cy="0"/>
-          <a:chOff x="0" y="0"/>
-          <a:chExt cx="0" cy="0"/>
-        </a:xfrm>
-      </p:grpSpPr>
-      <p:sp>
-        <p:nvSpPr>
-          <p:cNvPr id="4" name="Rectangle 3"/>
-          <p:cNvSpPr/>
-          <p:nvPr/>
-        </p:nvSpPr>
-        <p:spPr bwMode="auto">
-          <a:xfrm>
-            <a:off x="4622800" y="2036617"/>
-            <a:ext cx="4064000" cy="4525963"/>
-          </a:xfrm>
-          <a:prstGeom prst="rect">
-            <a:avLst/>
-          </a:prstGeom>
-          <a:noFill/>
-          <a:ln w="38100" cap="flat" cmpd="sng" algn="ctr">
-            <a:solidFill>
-              <a:srgbClr val="FF0000"/>
-            </a:solidFill>
-            <a:prstDash val="solid"/>
-            <a:round/>
-            <a:headEnd type="none" w="med" len="med"/>
-            <a:tailEnd type="none" w="med" len="med"/>
-          </a:ln>
-          <a:effectLst/>
-        </p:spPr>
-        <p:txBody>
-          <a:bodyPr vert="horz" wrap="none" lIns="90000" tIns="46800" rIns="90000" bIns="46800" numCol="1" rtlCol="0" anchor="ctr" anchorCtr="0" compatLnSpc="1">
-            <a:prstTxWarp prst="textNoShape">
-              <a:avLst/>
-            </a:prstTxWarp>
-            <a:spAutoFit/>
-          </a:bodyPr>
-          <a:lstStyle/>
-          <a:p>
-            <a:pPr marL="0" marR="0" indent="0" algn="ctr" defTabSz="914400" rtl="0" eaLnBrk="1" fontAlgn="base" latinLnBrk="0" hangingPunct="1">
-              <a:lnSpc>
-                <a:spcPct val="100000"/>
-              </a:lnSpc>
-              <a:spcBef>
-                <a:spcPct val="50000"/>
-              </a:spcBef>
-              <a:spcAft>
-                <a:spcPct val="0"/>
-              </a:spcAft>
-              <a:buClrTx/>
-              <a:buSzTx/>
-              <a:buFontTx/>
-              <a:buNone/>
-              <a:tabLst/>
-            </a:pPr>
-            <a:endParaRPr kumimoji="0" lang="fr-FR" sz="2400" b="0" i="0" u="none" strike="noStrike" cap="none" normalizeH="0" baseline="0" smtClean="0">
-              <a:ln>
-                <a:noFill/>
-              </a:ln>
-              <a:solidFill>
-                <a:schemeClr val="tx1"/>
-              </a:solidFill>
-              <a:effectLst/>
-              <a:latin typeface="Comic Sans MS" pitchFamily="66" charset="0"/>
-            </a:endParaRPr>
-          </a:p>
-        </p:txBody>
-      </p:sp>
-      <p:sp>
-        <p:nvSpPr>
-          <p:cNvPr id="6" name="ZoneTexte 5"/>
-          <p:cNvSpPr txBox="1"/>
-          <p:nvPr/>
-        </p:nvSpPr>
-        <p:spPr>
-          <a:xfrm>
-            <a:off x="5493327" y="1113287"/>
-            <a:ext cx="3454400" cy="923330"/>
-          </a:xfrm>
-          <a:prstGeom prst="rect">
-            <a:avLst/>
-          </a:prstGeom>
-          <a:noFill/>
-        </p:spPr>
-        <p:txBody>
-          <a:bodyPr wrap="square" rtlCol="0">
-            <a:spAutoFit/>
-          </a:bodyPr>
-          <a:lstStyle/>
-          <a:p>
-            <a:r>
-              <a:rPr lang="fr-FR" sz="5400" dirty="0" smtClean="0">
-                <a:latin typeface="Calibri" panose="020F0502020204030204" pitchFamily="34" charset="0"/>
-              </a:rPr>
-              <a:t>objets</a:t>
-            </a:r>
-            <a:endParaRPr lang="fr-FR" sz="5400" dirty="0">
-              <a:latin typeface="Calibri" panose="020F0502020204030204" pitchFamily="34" charset="0"/>
-            </a:endParaRPr>
-          </a:p>
-        </p:txBody>
-      </p:sp>
-      <p:sp>
-        <p:nvSpPr>
-          <p:cNvPr id="5" name="Rectangle 4"/>
-          <p:cNvSpPr/>
-          <p:nvPr/>
-        </p:nvSpPr>
-        <p:spPr bwMode="auto">
-          <a:xfrm>
-            <a:off x="457200" y="2036618"/>
-            <a:ext cx="4064000" cy="4525963"/>
-          </a:xfrm>
-          <a:prstGeom prst="rect">
-            <a:avLst/>
-          </a:prstGeom>
-          <a:noFill/>
-          <a:ln w="38100" cap="flat" cmpd="sng" algn="ctr">
-            <a:solidFill>
-              <a:srgbClr val="FF0000"/>
-            </a:solidFill>
-            <a:prstDash val="solid"/>
-            <a:round/>
-            <a:headEnd type="none" w="med" len="med"/>
-            <a:tailEnd type="none" w="med" len="med"/>
-          </a:ln>
-          <a:effectLst/>
-        </p:spPr>
-        <p:txBody>
-          <a:bodyPr vert="horz" wrap="none" lIns="90000" tIns="46800" rIns="90000" bIns="46800" numCol="1" rtlCol="0" anchor="ctr" anchorCtr="0" compatLnSpc="1">
-            <a:prstTxWarp prst="textNoShape">
-              <a:avLst/>
-            </a:prstTxWarp>
-            <a:spAutoFit/>
-          </a:bodyPr>
-          <a:lstStyle/>
-          <a:p>
-            <a:pPr marL="0" marR="0" indent="0" algn="ctr" defTabSz="914400" rtl="0" eaLnBrk="1" fontAlgn="base" latinLnBrk="0" hangingPunct="1">
-              <a:lnSpc>
-                <a:spcPct val="100000"/>
-              </a:lnSpc>
-              <a:spcBef>
-                <a:spcPct val="50000"/>
-              </a:spcBef>
-              <a:spcAft>
-                <a:spcPct val="0"/>
-              </a:spcAft>
-              <a:buClrTx/>
-              <a:buSzTx/>
-              <a:buFontTx/>
-              <a:buNone/>
-              <a:tabLst/>
-            </a:pPr>
-            <a:endParaRPr kumimoji="0" lang="fr-FR" sz="2400" b="0" i="0" u="none" strike="noStrike" cap="none" normalizeH="0" baseline="0" smtClean="0">
-              <a:ln>
-                <a:noFill/>
-              </a:ln>
-              <a:solidFill>
-                <a:schemeClr val="tx1"/>
-              </a:solidFill>
-              <a:effectLst/>
-              <a:latin typeface="Comic Sans MS" pitchFamily="66" charset="0"/>
-            </a:endParaRPr>
-          </a:p>
-        </p:txBody>
-      </p:sp>
-      <p:sp>
-        <p:nvSpPr>
-          <p:cNvPr id="7" name="ZoneTexte 6"/>
-          <p:cNvSpPr txBox="1"/>
-          <p:nvPr/>
-        </p:nvSpPr>
-        <p:spPr>
-          <a:xfrm>
-            <a:off x="1248064" y="1113287"/>
-            <a:ext cx="3454400" cy="923330"/>
-          </a:xfrm>
-          <a:prstGeom prst="rect">
-            <a:avLst/>
-          </a:prstGeom>
-          <a:noFill/>
-        </p:spPr>
-        <p:txBody>
-          <a:bodyPr wrap="square" rtlCol="0">
-            <a:spAutoFit/>
-          </a:bodyPr>
-          <a:lstStyle/>
-          <a:p>
-            <a:r>
-              <a:rPr lang="fr-FR" sz="5400" dirty="0" smtClean="0">
-                <a:latin typeface="Calibri" panose="020F0502020204030204" pitchFamily="34" charset="0"/>
-              </a:rPr>
-              <a:t>variables</a:t>
-            </a:r>
-            <a:endParaRPr lang="fr-FR" sz="5400" dirty="0">
-              <a:latin typeface="Calibri" panose="020F0502020204030204" pitchFamily="34" charset="0"/>
-            </a:endParaRPr>
-          </a:p>
-        </p:txBody>
-      </p:sp>
-      <p:sp>
-        <p:nvSpPr>
-          <p:cNvPr id="2" name="ZoneTexte 1"/>
-          <p:cNvSpPr txBox="1"/>
-          <p:nvPr/>
-        </p:nvSpPr>
-        <p:spPr>
-          <a:xfrm>
-            <a:off x="457200" y="322926"/>
-            <a:ext cx="6669809" cy="707886"/>
-          </a:xfrm>
-          <a:prstGeom prst="rect">
-            <a:avLst/>
-          </a:prstGeom>
-          <a:noFill/>
-        </p:spPr>
-        <p:txBody>
-          <a:bodyPr wrap="square" rtlCol="0">
-            <a:spAutoFit/>
-          </a:bodyPr>
-          <a:lstStyle/>
-          <a:p>
-            <a:r>
-              <a:rPr lang="fr-FR" sz="4000" dirty="0" smtClean="0">
-                <a:latin typeface="Courier New" panose="02070309020205020404" pitchFamily="49" charset="0"/>
-                <a:cs typeface="Courier New" panose="02070309020205020404" pitchFamily="49" charset="0"/>
-              </a:rPr>
-              <a:t>&gt;&gt;&gt; a = 3</a:t>
-            </a:r>
-            <a:endParaRPr lang="fr-FR" sz="4000" dirty="0">
-              <a:latin typeface="Courier New" panose="02070309020205020404" pitchFamily="49" charset="0"/>
-              <a:cs typeface="Courier New" panose="02070309020205020404" pitchFamily="49" charset="0"/>
-            </a:endParaRPr>
-          </a:p>
-        </p:txBody>
-      </p:sp>
-      <p:sp>
-        <p:nvSpPr>
-          <p:cNvPr id="8" name="ZoneTexte 7"/>
-          <p:cNvSpPr txBox="1"/>
-          <p:nvPr/>
-        </p:nvSpPr>
-        <p:spPr>
-          <a:xfrm>
-            <a:off x="6005945" y="3595255"/>
-            <a:ext cx="644237" cy="923330"/>
-          </a:xfrm>
-          <a:prstGeom prst="rect">
-            <a:avLst/>
-          </a:prstGeom>
-          <a:noFill/>
-          <a:ln w="38100">
-            <a:solidFill>
-              <a:schemeClr val="tx1"/>
-            </a:solidFill>
-          </a:ln>
-        </p:spPr>
-        <p:txBody>
-          <a:bodyPr wrap="square" rtlCol="0">
-            <a:spAutoFit/>
-          </a:bodyPr>
-          <a:lstStyle/>
-          <a:p>
-            <a:pPr algn="ctr"/>
-            <a:r>
-              <a:rPr lang="fr-FR" sz="5400" dirty="0" smtClean="0">
-                <a:latin typeface="Calibri" panose="020F0502020204030204" pitchFamily="34" charset="0"/>
-              </a:rPr>
-              <a:t>3</a:t>
-            </a:r>
-            <a:endParaRPr lang="fr-FR" sz="5400" dirty="0">
-              <a:latin typeface="Calibri" panose="020F0502020204030204" pitchFamily="34" charset="0"/>
-            </a:endParaRPr>
-          </a:p>
-        </p:txBody>
-      </p:sp>
-      <p:sp>
-        <p:nvSpPr>
-          <p:cNvPr id="9" name="ZoneTexte 8"/>
-          <p:cNvSpPr txBox="1"/>
-          <p:nvPr/>
-        </p:nvSpPr>
-        <p:spPr>
-          <a:xfrm>
-            <a:off x="1854778" y="3595255"/>
-            <a:ext cx="1080654" cy="923330"/>
-          </a:xfrm>
-          <a:prstGeom prst="rect">
-            <a:avLst/>
-          </a:prstGeom>
-          <a:noFill/>
-        </p:spPr>
-        <p:txBody>
-          <a:bodyPr wrap="square" rtlCol="0">
-            <a:spAutoFit/>
-          </a:bodyPr>
-          <a:lstStyle/>
-          <a:p>
-            <a:r>
-              <a:rPr lang="fr-FR" sz="5400" dirty="0">
-                <a:latin typeface="Calibri" panose="020F0502020204030204" pitchFamily="34" charset="0"/>
-              </a:rPr>
-              <a:t>a</a:t>
-            </a:r>
-            <a:endParaRPr lang="fr-FR" sz="5400" dirty="0" smtClean="0">
-              <a:latin typeface="Calibri" panose="020F0502020204030204" pitchFamily="34" charset="0"/>
-            </a:endParaRPr>
-          </a:p>
-        </p:txBody>
-      </p:sp>
-      <p:sp>
-        <p:nvSpPr>
-          <p:cNvPr id="12" name="Forme libre 11"/>
-          <p:cNvSpPr/>
-          <p:nvPr/>
-        </p:nvSpPr>
-        <p:spPr bwMode="auto">
-          <a:xfrm>
-            <a:off x="2348346" y="3075378"/>
-            <a:ext cx="3595254" cy="1101768"/>
-          </a:xfrm>
-          <a:custGeom>
-            <a:avLst/>
-            <a:gdLst>
-              <a:gd name="connsiteX0" fmla="*/ 0 w 3366654"/>
-              <a:gd name="connsiteY0" fmla="*/ 1144751 h 1144751"/>
-              <a:gd name="connsiteX1" fmla="*/ 1371600 w 3366654"/>
-              <a:gd name="connsiteY1" fmla="*/ 1751 h 1144751"/>
-              <a:gd name="connsiteX2" fmla="*/ 3366654 w 3366654"/>
-              <a:gd name="connsiteY2" fmla="*/ 936933 h 1144751"/>
-              <a:gd name="connsiteX0" fmla="*/ 0 w 3366654"/>
-              <a:gd name="connsiteY0" fmla="*/ 1103340 h 1103340"/>
-              <a:gd name="connsiteX1" fmla="*/ 1799729 w 3366654"/>
-              <a:gd name="connsiteY1" fmla="*/ 1904 h 1103340"/>
-              <a:gd name="connsiteX2" fmla="*/ 3366654 w 3366654"/>
-              <a:gd name="connsiteY2" fmla="*/ 895522 h 1103340"/>
-              <a:gd name="connsiteX0" fmla="*/ 0 w 3366654"/>
-              <a:gd name="connsiteY0" fmla="*/ 1103340 h 1103340"/>
-              <a:gd name="connsiteX1" fmla="*/ 1799729 w 3366654"/>
-              <a:gd name="connsiteY1" fmla="*/ 1904 h 1103340"/>
-              <a:gd name="connsiteX2" fmla="*/ 3366654 w 3366654"/>
-              <a:gd name="connsiteY2" fmla="*/ 895522 h 1103340"/>
-              <a:gd name="connsiteX0" fmla="*/ 0 w 3366654"/>
-              <a:gd name="connsiteY0" fmla="*/ 1101768 h 1101768"/>
-              <a:gd name="connsiteX1" fmla="*/ 1799729 w 3366654"/>
-              <a:gd name="connsiteY1" fmla="*/ 332 h 1101768"/>
-              <a:gd name="connsiteX2" fmla="*/ 3366654 w 3366654"/>
-              <a:gd name="connsiteY2" fmla="*/ 893950 h 1101768"/>
-            </a:gdLst>
-            <a:ahLst/>
-            <a:cxnLst>
-              <a:cxn ang="0">
-                <a:pos x="connsiteX0" y="connsiteY0"/>
-              </a:cxn>
-              <a:cxn ang="0">
-                <a:pos x="connsiteX1" y="connsiteY1"/>
-              </a:cxn>
-              <a:cxn ang="0">
-                <a:pos x="connsiteX2" y="connsiteY2"/>
-              </a:cxn>
-            </a:cxnLst>
-            <a:rect l="l" t="t" r="r" b="b"/>
-            <a:pathLst>
-              <a:path w="3366654" h="1101768">
-                <a:moveTo>
-                  <a:pt x="0" y="1101768"/>
-                </a:moveTo>
-                <a:cubicBezTo>
-                  <a:pt x="405245" y="547586"/>
-                  <a:pt x="1160778" y="14186"/>
-                  <a:pt x="1799729" y="332"/>
-                </a:cubicBezTo>
-                <a:cubicBezTo>
-                  <a:pt x="2438680" y="-13522"/>
-                  <a:pt x="2649681" y="409041"/>
-                  <a:pt x="3366654" y="893950"/>
-                </a:cubicBezTo>
-              </a:path>
-            </a:pathLst>
-          </a:custGeom>
-          <a:noFill/>
-          <a:ln w="38100" cap="flat" cmpd="sng" algn="ctr">
-            <a:solidFill>
-              <a:schemeClr val="tx1"/>
-            </a:solidFill>
-            <a:prstDash val="solid"/>
-            <a:round/>
-            <a:headEnd type="none" w="med" len="med"/>
-            <a:tailEnd type="triangle" w="lg" len="lg"/>
-          </a:ln>
-          <a:effectLst/>
-        </p:spPr>
-        <p:txBody>
-          <a:bodyPr rtlCol="0" anchor="ctr"/>
-          <a:lstStyle/>
-          <a:p>
-            <a:pPr algn="ctr"/>
-            <a:endParaRPr lang="fr-FR"/>
-          </a:p>
-        </p:txBody>
-      </p:sp>
-    </p:spTree>
-    <p:extLst>
-      <p:ext uri="{BB962C8B-B14F-4D97-AF65-F5344CB8AC3E}">
-        <p14:creationId xmlns:p14="http://schemas.microsoft.com/office/powerpoint/2010/main" val="1220478283"/>
-      </p:ext>
-    </p:extLst>
-  </p:cSld>
-  <p:clrMapOvr>
-    <a:masterClrMapping/>
-  </p:clrMapOvr>
-  <p:timing>
-    <p:tnLst>
-      <p:par>
-        <p:cTn id="1" dur="indefinite" restart="never" nodeType="tmRoot">
-          <p:childTnLst>
-            <p:seq concurrent="1" nextAc="seek">
-              <p:cTn id="2" dur="indefinite" nodeType="mainSeq">
-                <p:childTnLst>
-                  <p:par>
-                    <p:cTn id="3" fill="hold">
-                      <p:stCondLst>
-                        <p:cond delay="indefinite"/>
-                      </p:stCondLst>
-                      <p:childTnLst>
-                        <p:par>
-                          <p:cTn id="4" fill="hold">
-                            <p:stCondLst>
-                              <p:cond delay="0"/>
-                            </p:stCondLst>
-                            <p:childTnLst>
-                              <p:par>
-                                <p:cTn id="5" presetID="10" presetClass="entr" presetSubtype="0" fill="hold" grpId="0" nodeType="clickEffect">
-                                  <p:stCondLst>
-                                    <p:cond delay="0"/>
-                                  </p:stCondLst>
-                                  <p:childTnLst>
-                                    <p:set>
-                                      <p:cBhvr>
-                                        <p:cTn id="6" dur="1" fill="hold">
-                                          <p:stCondLst>
-                                            <p:cond delay="0"/>
-                                          </p:stCondLst>
-                                        </p:cTn>
-                                        <p:tgtEl>
-                                          <p:spTgt spid="2"/>
-                                        </p:tgtEl>
-                                        <p:attrNameLst>
-                                          <p:attrName>style.visibility</p:attrName>
-                                        </p:attrNameLst>
-                                      </p:cBhvr>
-                                      <p:to>
-                                        <p:strVal val="visible"/>
-                                      </p:to>
-                                    </p:set>
-                                    <p:animEffect transition="in" filter="fade">
-                                      <p:cBhvr>
-                                        <p:cTn id="7" dur="500"/>
-                                        <p:tgtEl>
-                                          <p:spTgt spid="2"/>
-                                        </p:tgtEl>
-                                      </p:cBhvr>
-                                    </p:animEffect>
-                                  </p:childTnLst>
-                                </p:cTn>
-                              </p:par>
-                            </p:childTnLst>
-                          </p:cTn>
-                        </p:par>
-                      </p:childTnLst>
-                    </p:cTn>
-                  </p:par>
-                  <p:par>
-                    <p:cTn id="8" fill="hold">
-                      <p:stCondLst>
-                        <p:cond delay="indefinite"/>
-                      </p:stCondLst>
-                      <p:childTnLst>
-                        <p:par>
-                          <p:cTn id="9" fill="hold">
-                            <p:stCondLst>
-                              <p:cond delay="0"/>
-                            </p:stCondLst>
-                            <p:childTnLst>
-                              <p:par>
-                                <p:cTn id="10" presetID="10" presetClass="entr" presetSubtype="0" fill="hold" grpId="0" nodeType="clickEffect">
-                                  <p:stCondLst>
-                                    <p:cond delay="0"/>
-                                  </p:stCondLst>
-                                  <p:childTnLst>
-                                    <p:set>
-                                      <p:cBhvr>
-                                        <p:cTn id="11" dur="1" fill="hold">
-                                          <p:stCondLst>
-                                            <p:cond delay="0"/>
-                                          </p:stCondLst>
-                                        </p:cTn>
-                                        <p:tgtEl>
-                                          <p:spTgt spid="6"/>
-                                        </p:tgtEl>
-                                        <p:attrNameLst>
-                                          <p:attrName>style.visibility</p:attrName>
-                                        </p:attrNameLst>
-                                      </p:cBhvr>
-                                      <p:to>
-                                        <p:strVal val="visible"/>
-                                      </p:to>
-                                    </p:set>
-                                    <p:animEffect transition="in" filter="fade">
-                                      <p:cBhvr>
-                                        <p:cTn id="12" dur="500"/>
-                                        <p:tgtEl>
-                                          <p:spTgt spid="6"/>
-                                        </p:tgtEl>
-                                      </p:cBhvr>
-                                    </p:animEffect>
-                                  </p:childTnLst>
-                                </p:cTn>
-                              </p:par>
-                              <p:par>
-                                <p:cTn id="13" presetID="10" presetClass="entr" presetSubtype="0" fill="hold" grpId="0" nodeType="withEffect">
-                                  <p:stCondLst>
-                                    <p:cond delay="0"/>
-                                  </p:stCondLst>
-                                  <p:childTnLst>
-                                    <p:set>
-                                      <p:cBhvr>
-                                        <p:cTn id="14" dur="1" fill="hold">
-                                          <p:stCondLst>
-                                            <p:cond delay="0"/>
-                                          </p:stCondLst>
-                                        </p:cTn>
-                                        <p:tgtEl>
-                                          <p:spTgt spid="4"/>
-                                        </p:tgtEl>
-                                        <p:attrNameLst>
-                                          <p:attrName>style.visibility</p:attrName>
-                                        </p:attrNameLst>
-                                      </p:cBhvr>
-                                      <p:to>
-                                        <p:strVal val="visible"/>
-                                      </p:to>
-                                    </p:set>
-                                    <p:animEffect transition="in" filter="fade">
-                                      <p:cBhvr>
-                                        <p:cTn id="15" dur="500"/>
-                                        <p:tgtEl>
-                                          <p:spTgt spid="4"/>
-                                        </p:tgtEl>
-                                      </p:cBhvr>
-                                    </p:animEffect>
-                                  </p:childTnLst>
-                                </p:cTn>
-                              </p:par>
-                              <p:par>
-                                <p:cTn id="16" presetID="10" presetClass="entr" presetSubtype="0" fill="hold" grpId="0" nodeType="withEffect">
-                                  <p:stCondLst>
-                                    <p:cond delay="0"/>
-                                  </p:stCondLst>
-                                  <p:childTnLst>
-                                    <p:set>
-                                      <p:cBhvr>
-                                        <p:cTn id="17" dur="1" fill="hold">
-                                          <p:stCondLst>
-                                            <p:cond delay="0"/>
-                                          </p:stCondLst>
-                                        </p:cTn>
-                                        <p:tgtEl>
-                                          <p:spTgt spid="7"/>
-                                        </p:tgtEl>
-                                        <p:attrNameLst>
-                                          <p:attrName>style.visibility</p:attrName>
-                                        </p:attrNameLst>
-                                      </p:cBhvr>
-                                      <p:to>
-                                        <p:strVal val="visible"/>
-                                      </p:to>
-                                    </p:set>
-                                    <p:animEffect transition="in" filter="fade">
-                                      <p:cBhvr>
-                                        <p:cTn id="18" dur="500"/>
-                                        <p:tgtEl>
-                                          <p:spTgt spid="7"/>
-                                        </p:tgtEl>
-                                      </p:cBhvr>
-                                    </p:animEffect>
-                                  </p:childTnLst>
-                                </p:cTn>
-                              </p:par>
-                              <p:par>
-                                <p:cTn id="19" presetID="10" presetClass="entr" presetSubtype="0" fill="hold" grpId="0" nodeType="withEffect">
-                                  <p:stCondLst>
-                                    <p:cond delay="0"/>
-                                  </p:stCondLst>
-                                  <p:childTnLst>
-                                    <p:set>
-                                      <p:cBhvr>
-                                        <p:cTn id="20" dur="1" fill="hold">
-                                          <p:stCondLst>
-                                            <p:cond delay="0"/>
-                                          </p:stCondLst>
-                                        </p:cTn>
-                                        <p:tgtEl>
-                                          <p:spTgt spid="5"/>
-                                        </p:tgtEl>
-                                        <p:attrNameLst>
-                                          <p:attrName>style.visibility</p:attrName>
-                                        </p:attrNameLst>
-                                      </p:cBhvr>
-                                      <p:to>
-                                        <p:strVal val="visible"/>
-                                      </p:to>
-                                    </p:set>
-                                    <p:animEffect transition="in" filter="fade">
-                                      <p:cBhvr>
-                                        <p:cTn id="21" dur="500"/>
-                                        <p:tgtEl>
-                                          <p:spTgt spid="5"/>
-                                        </p:tgtEl>
-                                      </p:cBhvr>
-                                    </p:animEffect>
-                                  </p:childTnLst>
-                                </p:cTn>
-                              </p:par>
-                            </p:childTnLst>
-                          </p:cTn>
-                        </p:par>
-                      </p:childTnLst>
-                    </p:cTn>
-                  </p:par>
-                  <p:par>
-                    <p:cTn id="22" fill="hold">
-                      <p:stCondLst>
-                        <p:cond delay="indefinite"/>
-                      </p:stCondLst>
-                      <p:childTnLst>
-                        <p:par>
-                          <p:cTn id="23" fill="hold">
-                            <p:stCondLst>
-                              <p:cond delay="0"/>
-                            </p:stCondLst>
-                            <p:childTnLst>
-                              <p:par>
-                                <p:cTn id="24" presetID="10" presetClass="entr" presetSubtype="0" fill="hold" grpId="0" nodeType="clickEffect">
-                                  <p:stCondLst>
-                                    <p:cond delay="0"/>
-                                  </p:stCondLst>
-                                  <p:childTnLst>
-                                    <p:set>
-                                      <p:cBhvr>
-                                        <p:cTn id="25" dur="1" fill="hold">
-                                          <p:stCondLst>
-                                            <p:cond delay="0"/>
-                                          </p:stCondLst>
-                                        </p:cTn>
-                                        <p:tgtEl>
-                                          <p:spTgt spid="8"/>
-                                        </p:tgtEl>
-                                        <p:attrNameLst>
-                                          <p:attrName>style.visibility</p:attrName>
-                                        </p:attrNameLst>
-                                      </p:cBhvr>
-                                      <p:to>
-                                        <p:strVal val="visible"/>
-                                      </p:to>
-                                    </p:set>
-                                    <p:animEffect transition="in" filter="fade">
-                                      <p:cBhvr>
-                                        <p:cTn id="26" dur="500"/>
-                                        <p:tgtEl>
-                                          <p:spTgt spid="8"/>
-                                        </p:tgtEl>
-                                      </p:cBhvr>
-                                    </p:animEffect>
-                                  </p:childTnLst>
-                                </p:cTn>
-                              </p:par>
-                            </p:childTnLst>
-                          </p:cTn>
-                        </p:par>
-                      </p:childTnLst>
-                    </p:cTn>
-                  </p:par>
-                  <p:par>
-                    <p:cTn id="27" fill="hold">
-                      <p:stCondLst>
-                        <p:cond delay="indefinite"/>
-                      </p:stCondLst>
-                      <p:childTnLst>
-                        <p:par>
-                          <p:cTn id="28" fill="hold">
-                            <p:stCondLst>
-                              <p:cond delay="0"/>
-                            </p:stCondLst>
-                            <p:childTnLst>
-                              <p:par>
-                                <p:cTn id="29" presetID="10" presetClass="entr" presetSubtype="0" fill="hold" grpId="0" nodeType="clickEffect">
-                                  <p:stCondLst>
-                                    <p:cond delay="0"/>
-                                  </p:stCondLst>
-                                  <p:childTnLst>
-                                    <p:set>
-                                      <p:cBhvr>
-                                        <p:cTn id="30" dur="1" fill="hold">
-                                          <p:stCondLst>
-                                            <p:cond delay="0"/>
-                                          </p:stCondLst>
-                                        </p:cTn>
-                                        <p:tgtEl>
-                                          <p:spTgt spid="9"/>
-                                        </p:tgtEl>
-                                        <p:attrNameLst>
-                                          <p:attrName>style.visibility</p:attrName>
-                                        </p:attrNameLst>
-                                      </p:cBhvr>
-                                      <p:to>
-                                        <p:strVal val="visible"/>
-                                      </p:to>
-                                    </p:set>
-                                    <p:animEffect transition="in" filter="fade">
-                                      <p:cBhvr>
-                                        <p:cTn id="31" dur="500"/>
-                                        <p:tgtEl>
-                                          <p:spTgt spid="9"/>
-                                        </p:tgtEl>
-                                      </p:cBhvr>
-                                    </p:animEffect>
-                                  </p:childTnLst>
-                                </p:cTn>
-                              </p:par>
-                            </p:childTnLst>
-                          </p:cTn>
-                        </p:par>
-                      </p:childTnLst>
-                    </p:cTn>
-                  </p:par>
-                  <p:par>
-                    <p:cTn id="32" fill="hold">
-                      <p:stCondLst>
-                        <p:cond delay="indefinite"/>
-                      </p:stCondLst>
-                      <p:childTnLst>
-                        <p:par>
-                          <p:cTn id="33" fill="hold">
-                            <p:stCondLst>
-                              <p:cond delay="0"/>
-                            </p:stCondLst>
-                            <p:childTnLst>
-                              <p:par>
-                                <p:cTn id="34" presetID="10" presetClass="entr" presetSubtype="0" fill="hold" grpId="0" nodeType="clickEffect">
-                                  <p:stCondLst>
-                                    <p:cond delay="0"/>
-                                  </p:stCondLst>
-                                  <p:childTnLst>
-                                    <p:set>
-                                      <p:cBhvr>
-                                        <p:cTn id="35" dur="1" fill="hold">
-                                          <p:stCondLst>
-                                            <p:cond delay="0"/>
-                                          </p:stCondLst>
-                                        </p:cTn>
-                                        <p:tgtEl>
-                                          <p:spTgt spid="12"/>
-                                        </p:tgtEl>
-                                        <p:attrNameLst>
-                                          <p:attrName>style.visibility</p:attrName>
-                                        </p:attrNameLst>
-                                      </p:cBhvr>
-                                      <p:to>
-                                        <p:strVal val="visible"/>
-                                      </p:to>
-                                    </p:set>
-                                    <p:animEffect transition="in" filter="fade">
-                                      <p:cBhvr>
-                                        <p:cTn id="36" dur="500"/>
-                                        <p:tgtEl>
-                                          <p:spTgt spid="12"/>
-                                        </p:tgtEl>
-                                      </p:cBhvr>
-                                    </p:animEffect>
-                                  </p:childTnLst>
-                                </p:cTn>
-                              </p:par>
-                            </p:childTnLst>
-                          </p:cTn>
-                        </p:par>
-                      </p:childTnLst>
-                    </p:cTn>
-                  </p:par>
-                </p:childTnLst>
-              </p:cTn>
-              <p:prevCondLst>
-                <p:cond evt="onPrev" delay="0">
-                  <p:tgtEl>
-                    <p:sldTgt/>
-                  </p:tgtEl>
-                </p:cond>
-              </p:prevCondLst>
-              <p:nextCondLst>
-                <p:cond evt="onNext" delay="0">
-                  <p:tgtEl>
-                    <p:sldTgt/>
-                  </p:tgtEl>
-                </p:cond>
-              </p:nextCondLst>
-            </p:seq>
-          </p:childTnLst>
-        </p:cTn>
-      </p:par>
-    </p:tnLst>
-    <p:bldLst>
-      <p:bldP spid="4" grpId="0" animBg="1"/>
-      <p:bldP spid="6" grpId="0"/>
-      <p:bldP spid="5" grpId="0" animBg="1"/>
-      <p:bldP spid="7" grpId="0"/>
-      <p:bldP spid="2" grpId="0"/>
-      <p:bldP spid="8" grpId="0" animBg="1"/>
-      <p:bldP spid="9" grpId="0"/>
-      <p:bldP spid="12" grpId="0" animBg="1"/>
-    </p:bldLst>
-  </p:timing>
-</p:sld>
-</file>
-
-<file path=ppt/slides/slide6.xml><?xml version="1.0" encoding="utf-8"?>
-<p:sld xmlns:a="http://schemas.openxmlformats.org/drawingml/2006/main" xmlns:r="http://schemas.openxmlformats.org/officeDocument/2006/relationships" xmlns:p="http://schemas.openxmlformats.org/presentationml/2006/main">
-  <p:cSld>
-    <p:spTree>
-      <p:nvGrpSpPr>
-        <p:cNvPr id="1" name=""/>
-        <p:cNvGrpSpPr/>
-        <p:nvPr/>
-      </p:nvGrpSpPr>
-      <p:grpSpPr>
-        <a:xfrm>
-          <a:off x="0" y="0"/>
-          <a:ext cx="0" cy="0"/>
-          <a:chOff x="0" y="0"/>
-          <a:chExt cx="0" cy="0"/>
-        </a:xfrm>
-      </p:grpSpPr>
-      <p:sp>
-        <p:nvSpPr>
-          <p:cNvPr id="2" name="Titre 1"/>
-          <p:cNvSpPr>
-            <a:spLocks noGrp="1"/>
-          </p:cNvSpPr>
-          <p:nvPr>
-            <p:ph type="title"/>
-          </p:nvPr>
-        </p:nvSpPr>
-        <p:spPr/>
-        <p:txBody>
-          <a:bodyPr/>
-          <a:lstStyle/>
-          <a:p>
-            <a:r>
-              <a:rPr lang="fr-FR" dirty="0" smtClean="0"/>
-              <a:t>Types de base</a:t>
-            </a:r>
-            <a:endParaRPr lang="fr-FR" dirty="0"/>
-          </a:p>
-        </p:txBody>
-      </p:sp>
-      <p:sp>
-        <p:nvSpPr>
-          <p:cNvPr id="3" name="Espace réservé du contenu 2"/>
-          <p:cNvSpPr>
-            <a:spLocks noGrp="1"/>
-          </p:cNvSpPr>
-          <p:nvPr>
-            <p:ph idx="1"/>
-          </p:nvPr>
-        </p:nvSpPr>
-        <p:spPr>
-          <a:xfrm>
-            <a:off x="457200" y="1417638"/>
-            <a:ext cx="8229600" cy="4708525"/>
-          </a:xfrm>
-        </p:spPr>
-        <p:txBody>
-          <a:bodyPr/>
-          <a:lstStyle/>
-          <a:p>
-            <a:r>
-              <a:rPr lang="fr-FR" sz="2800" dirty="0" smtClean="0">
-                <a:solidFill>
-                  <a:srgbClr val="FF0000"/>
-                </a:solidFill>
-              </a:rPr>
-              <a:t>Nombres</a:t>
-            </a:r>
-          </a:p>
-          <a:p>
-            <a:pPr lvl="1"/>
-            <a:r>
-              <a:rPr lang="fr-FR" sz="2400" dirty="0" err="1">
-                <a:solidFill>
-                  <a:srgbClr val="FF0000"/>
-                </a:solidFill>
-                <a:latin typeface="Courier New" pitchFamily="49" charset="0"/>
-                <a:cs typeface="Courier New" pitchFamily="49" charset="0"/>
-              </a:rPr>
-              <a:t>i</a:t>
-            </a:r>
-            <a:r>
-              <a:rPr lang="fr-FR" sz="2400" dirty="0" err="1" smtClean="0">
-                <a:solidFill>
-                  <a:srgbClr val="FF0000"/>
-                </a:solidFill>
-                <a:latin typeface="Courier New" pitchFamily="49" charset="0"/>
-                <a:cs typeface="Courier New" pitchFamily="49" charset="0"/>
-              </a:rPr>
-              <a:t>nt</a:t>
-            </a:r>
-            <a:r>
-              <a:rPr lang="fr-FR" sz="2400" dirty="0" smtClean="0">
-                <a:solidFill>
-                  <a:srgbClr val="FF0000"/>
-                </a:solidFill>
-                <a:latin typeface="Courier New" pitchFamily="49" charset="0"/>
-                <a:cs typeface="Courier New" pitchFamily="49" charset="0"/>
-              </a:rPr>
-              <a:t>, long, </a:t>
-            </a:r>
-            <a:r>
-              <a:rPr lang="fr-FR" sz="2400" dirty="0" err="1" smtClean="0">
-                <a:solidFill>
-                  <a:srgbClr val="FF0000"/>
-                </a:solidFill>
-                <a:latin typeface="Courier New" pitchFamily="49" charset="0"/>
-                <a:cs typeface="Courier New" pitchFamily="49" charset="0"/>
-              </a:rPr>
-              <a:t>float</a:t>
-            </a:r>
-            <a:r>
-              <a:rPr lang="fr-FR" sz="2400" dirty="0" smtClean="0">
-                <a:solidFill>
-                  <a:srgbClr val="FF0000"/>
-                </a:solidFill>
-                <a:latin typeface="Courier New" pitchFamily="49" charset="0"/>
-                <a:cs typeface="Courier New" pitchFamily="49" charset="0"/>
-              </a:rPr>
-              <a:t>, </a:t>
-            </a:r>
-            <a:r>
-              <a:rPr lang="fr-FR" sz="2400" dirty="0" err="1" smtClean="0">
-                <a:solidFill>
-                  <a:srgbClr val="FF0000"/>
-                </a:solidFill>
-                <a:latin typeface="Courier New" pitchFamily="49" charset="0"/>
-                <a:cs typeface="Courier New" pitchFamily="49" charset="0"/>
-              </a:rPr>
-              <a:t>complex</a:t>
-            </a:r>
-            <a:r>
-              <a:rPr lang="fr-FR" sz="2400" dirty="0" smtClean="0">
-                <a:solidFill>
-                  <a:srgbClr val="FF0000"/>
-                </a:solidFill>
-                <a:latin typeface="Courier New" pitchFamily="49" charset="0"/>
-                <a:cs typeface="Courier New" pitchFamily="49" charset="0"/>
-              </a:rPr>
-              <a:t>, </a:t>
-            </a:r>
-            <a:r>
-              <a:rPr lang="fr-FR" sz="2400" dirty="0" err="1" smtClean="0">
-                <a:solidFill>
-                  <a:srgbClr val="FF0000"/>
-                </a:solidFill>
-                <a:latin typeface="Courier New" pitchFamily="49" charset="0"/>
-                <a:cs typeface="Courier New" pitchFamily="49" charset="0"/>
-              </a:rPr>
-              <a:t>bool</a:t>
-            </a:r>
-            <a:endParaRPr lang="fr-FR" sz="2400" dirty="0" smtClean="0">
-              <a:solidFill>
-                <a:srgbClr val="FF0000"/>
-              </a:solidFill>
-              <a:latin typeface="Courier New" pitchFamily="49" charset="0"/>
-              <a:cs typeface="Courier New" pitchFamily="49" charset="0"/>
-            </a:endParaRPr>
-          </a:p>
-        </p:txBody>
-      </p:sp>
-    </p:spTree>
-    <p:extLst>
-      <p:ext uri="{BB962C8B-B14F-4D97-AF65-F5344CB8AC3E}">
-        <p14:creationId xmlns:p14="http://schemas.microsoft.com/office/powerpoint/2010/main" val="1223347470"/>
+        <p14:creationId xmlns:p14="http://schemas.microsoft.com/office/powerpoint/2010/main" val="391862887"/>
       </p:ext>
     </p:extLst>
   </p:cSld>

</xml_diff>